<commit_message>
update folien und pdf
</commit_message>
<xml_diff>
--- a/prototype/Praesentation_Vorlage_OOP_2023_2_OOP.pptx
+++ b/prototype/Praesentation_Vorlage_OOP_2023_2_OOP.pptx
@@ -237,7 +237,7 @@
           <a:p>
             <a:fld id="{A923DEBB-A8B7-4651-B065-888F326E9B5F}" type="datetimeFigureOut">
               <a:rPr lang="en-ID" smtClean="0"/>
-              <a:t>01/02/2023</a:t>
+              <a:t>02/02/2023</a:t>
             </a:fld>
             <a:endParaRPr lang="en-ID"/>
           </a:p>
@@ -655,7 +655,7 @@
             </a:pPr>
             <a:fld id="{911D8C60-1F2D-4436-BF53-22882F494404}" type="datetimeFigureOut">
               <a:rPr lang="de-DE"/>
-              <a:t>01.02.2023</a:t>
+              <a:t>02.02.2023</a:t>
             </a:fld>
             <a:endParaRPr lang="de-DE"/>
           </a:p>
@@ -3313,10 +3313,10 @@
       </p:sp>
       <p:pic>
         <p:nvPicPr>
-          <p:cNvPr id="10" name="Picture 9">
+          <p:cNvPr id="4" name="Picture 3">
             <a:extLst>
               <a:ext uri="{FF2B5EF4-FFF2-40B4-BE49-F238E27FC236}">
-                <a16:creationId xmlns:a16="http://schemas.microsoft.com/office/drawing/2014/main" id="{2451670F-467B-628C-FDD3-EA4FD179FD0B}"/>
+                <a16:creationId xmlns:a16="http://schemas.microsoft.com/office/drawing/2014/main" id="{46F4067B-667B-547F-D672-5248954D0B83}"/>
               </a:ext>
             </a:extLst>
           </p:cNvPr>
@@ -3333,8 +3333,8 @@
         </p:blipFill>
         <p:spPr>
           <a:xfrm>
-            <a:off x="1263576" y="1426104"/>
-            <a:ext cx="6612487" cy="3591636"/>
+            <a:off x="975544" y="1355568"/>
+            <a:ext cx="7403958" cy="3590164"/>
           </a:xfrm>
           <a:prstGeom prst="rect">
             <a:avLst/>
@@ -4182,10 +4182,10 @@
       </p:sp>
       <p:pic>
         <p:nvPicPr>
-          <p:cNvPr id="5" name="Picture 4">
+          <p:cNvPr id="6" name="Picture 5">
             <a:extLst>
               <a:ext uri="{FF2B5EF4-FFF2-40B4-BE49-F238E27FC236}">
-                <a16:creationId xmlns:a16="http://schemas.microsoft.com/office/drawing/2014/main" id="{9BA19E24-9C31-9C7D-A041-DB2BC290F24D}"/>
+                <a16:creationId xmlns:a16="http://schemas.microsoft.com/office/drawing/2014/main" id="{75E006CF-B38C-4D78-A308-61062552E542}"/>
               </a:ext>
             </a:extLst>
           </p:cNvPr>
@@ -4202,8 +4202,8 @@
         </p:blipFill>
         <p:spPr>
           <a:xfrm>
-            <a:off x="4143896" y="2425452"/>
-            <a:ext cx="3384376" cy="1786856"/>
+            <a:off x="3279800" y="2569468"/>
+            <a:ext cx="5747083" cy="2085370"/>
           </a:xfrm>
           <a:prstGeom prst="rect">
             <a:avLst/>

</xml_diff>

<commit_message>
updated presentation w/o metrik auswertung
</commit_message>
<xml_diff>
--- a/prototype/Praesentation_Vorlage_OOP_2023_2_OOP.pptx
+++ b/prototype/Praesentation_Vorlage_OOP_2023_2_OOP.pptx
@@ -5,7 +5,7 @@
     <p:sldMasterId id="2147483648" r:id="rId1"/>
   </p:sldMasterIdLst>
   <p:notesMasterIdLst>
-    <p:notesMasterId r:id="rId29"/>
+    <p:notesMasterId r:id="rId30"/>
   </p:notesMasterIdLst>
   <p:sldIdLst>
     <p:sldId id="256" r:id="rId2"/>
@@ -31,10 +31,11 @@
     <p:sldId id="269" r:id="rId22"/>
     <p:sldId id="297" r:id="rId23"/>
     <p:sldId id="270" r:id="rId24"/>
-    <p:sldId id="271" r:id="rId25"/>
-    <p:sldId id="272" r:id="rId26"/>
-    <p:sldId id="295" r:id="rId27"/>
-    <p:sldId id="294" r:id="rId28"/>
+    <p:sldId id="299" r:id="rId25"/>
+    <p:sldId id="271" r:id="rId26"/>
+    <p:sldId id="272" r:id="rId27"/>
+    <p:sldId id="295" r:id="rId28"/>
+    <p:sldId id="294" r:id="rId29"/>
   </p:sldIdLst>
   <p:sldSz cx="10160000" cy="5715000"/>
   <p:notesSz cx="10160000" cy="5715000"/>
@@ -155,6 +156,213 @@
 </p:presentation>
 </file>
 
+<file path=ppt/revisionInfo.xml><?xml version="1.0" encoding="utf-8"?>
+<p1510:revInfo xmlns:a="http://schemas.openxmlformats.org/drawingml/2006/main" xmlns:r="http://schemas.openxmlformats.org/officeDocument/2006/relationships" xmlns:p1510="http://schemas.microsoft.com/office/powerpoint/2015/10/main">
+  <p1510:revLst>
+    <p1510:client id="{1089C391-FFDE-4EC2-B73C-58CF154F0003}" v="10" dt="2023-02-08T21:24:40.763"/>
+  </p1510:revLst>
+</p1510:revInfo>
+</file>
+
+<file path=ppt/changesInfos/changesInfo1.xml><?xml version="1.0" encoding="utf-8"?>
+<pc:chgInfo xmlns:a="http://schemas.openxmlformats.org/drawingml/2006/main" xmlns:r="http://schemas.openxmlformats.org/officeDocument/2006/relationships" xmlns:ac="http://schemas.microsoft.com/office/drawing/2013/main/command" xmlns:pc="http://schemas.microsoft.com/office/powerpoint/2013/main/command">
+  <pc:docChgLst>
+    <pc:chgData name="Silvia Wen" userId="fa3c34b288dc686c" providerId="LiveId" clId="{1089C391-FFDE-4EC2-B73C-58CF154F0003}"/>
+    <pc:docChg chg="custSel addSld delSld modSld sldOrd">
+      <pc:chgData name="Silvia Wen" userId="fa3c34b288dc686c" providerId="LiveId" clId="{1089C391-FFDE-4EC2-B73C-58CF154F0003}" dt="2023-02-08T21:24:44.821" v="72" actId="1076"/>
+      <pc:docMkLst>
+        <pc:docMk/>
+      </pc:docMkLst>
+      <pc:sldChg chg="addSp delSp modSp mod">
+        <pc:chgData name="Silvia Wen" userId="fa3c34b288dc686c" providerId="LiveId" clId="{1089C391-FFDE-4EC2-B73C-58CF154F0003}" dt="2023-02-08T21:21:35.787" v="17" actId="1076"/>
+        <pc:sldMkLst>
+          <pc:docMk/>
+          <pc:sldMk cId="0" sldId="270"/>
+        </pc:sldMkLst>
+        <pc:picChg chg="add mod">
+          <ac:chgData name="Silvia Wen" userId="fa3c34b288dc686c" providerId="LiveId" clId="{1089C391-FFDE-4EC2-B73C-58CF154F0003}" dt="2023-02-08T21:21:35.787" v="17" actId="1076"/>
+          <ac:picMkLst>
+            <pc:docMk/>
+            <pc:sldMk cId="0" sldId="270"/>
+            <ac:picMk id="4" creationId="{B614220C-52EF-6B79-B8AD-8D481635475F}"/>
+          </ac:picMkLst>
+        </pc:picChg>
+        <pc:picChg chg="del">
+          <ac:chgData name="Silvia Wen" userId="fa3c34b288dc686c" providerId="LiveId" clId="{1089C391-FFDE-4EC2-B73C-58CF154F0003}" dt="2023-02-08T21:21:24.923" v="13" actId="478"/>
+          <ac:picMkLst>
+            <pc:docMk/>
+            <pc:sldMk cId="0" sldId="270"/>
+            <ac:picMk id="5" creationId="{8D568121-278A-6160-790D-96EE234F57F7}"/>
+          </ac:picMkLst>
+        </pc:picChg>
+      </pc:sldChg>
+      <pc:sldChg chg="addSp delSp modSp mod">
+        <pc:chgData name="Silvia Wen" userId="fa3c34b288dc686c" providerId="LiveId" clId="{1089C391-FFDE-4EC2-B73C-58CF154F0003}" dt="2023-02-08T21:23:25.022" v="68" actId="1076"/>
+        <pc:sldMkLst>
+          <pc:docMk/>
+          <pc:sldMk cId="0" sldId="271"/>
+        </pc:sldMkLst>
+        <pc:spChg chg="add del mod">
+          <ac:chgData name="Silvia Wen" userId="fa3c34b288dc686c" providerId="LiveId" clId="{1089C391-FFDE-4EC2-B73C-58CF154F0003}" dt="2023-02-08T21:21:42.874" v="19" actId="478"/>
+          <ac:spMkLst>
+            <pc:docMk/>
+            <pc:sldMk cId="0" sldId="271"/>
+            <ac:spMk id="2" creationId="{58E968A7-1E96-630C-2F6A-DB43414346ED}"/>
+          </ac:spMkLst>
+        </pc:spChg>
+        <pc:picChg chg="add del mod">
+          <ac:chgData name="Silvia Wen" userId="fa3c34b288dc686c" providerId="LiveId" clId="{1089C391-FFDE-4EC2-B73C-58CF154F0003}" dt="2023-02-08T21:23:03.045" v="56" actId="478"/>
+          <ac:picMkLst>
+            <pc:docMk/>
+            <pc:sldMk cId="0" sldId="271"/>
+            <ac:picMk id="5" creationId="{4C87FF4D-89EA-BFFC-D8B1-16584E8849E6}"/>
+          </ac:picMkLst>
+        </pc:picChg>
+        <pc:picChg chg="add mod">
+          <ac:chgData name="Silvia Wen" userId="fa3c34b288dc686c" providerId="LiveId" clId="{1089C391-FFDE-4EC2-B73C-58CF154F0003}" dt="2023-02-08T21:23:20.966" v="65" actId="1076"/>
+          <ac:picMkLst>
+            <pc:docMk/>
+            <pc:sldMk cId="0" sldId="271"/>
+            <ac:picMk id="7" creationId="{D0F1D42C-2DF5-435F-7834-7A82170957F1}"/>
+          </ac:picMkLst>
+        </pc:picChg>
+        <pc:picChg chg="add mod">
+          <ac:chgData name="Silvia Wen" userId="fa3c34b288dc686c" providerId="LiveId" clId="{1089C391-FFDE-4EC2-B73C-58CF154F0003}" dt="2023-02-08T21:23:25.022" v="68" actId="1076"/>
+          <ac:picMkLst>
+            <pc:docMk/>
+            <pc:sldMk cId="0" sldId="271"/>
+            <ac:picMk id="9" creationId="{08ECD5E4-CCA6-1B34-210E-D4BA245C5F6B}"/>
+          </ac:picMkLst>
+        </pc:picChg>
+        <pc:picChg chg="del">
+          <ac:chgData name="Silvia Wen" userId="fa3c34b288dc686c" providerId="LiveId" clId="{1089C391-FFDE-4EC2-B73C-58CF154F0003}" dt="2023-02-08T21:21:40.654" v="18" actId="478"/>
+          <ac:picMkLst>
+            <pc:docMk/>
+            <pc:sldMk cId="0" sldId="271"/>
+            <ac:picMk id="3074" creationId="{00000000-0000-0000-0000-000000000000}"/>
+          </ac:picMkLst>
+        </pc:picChg>
+      </pc:sldChg>
+      <pc:sldChg chg="delSp modSp mod">
+        <pc:chgData name="Silvia Wen" userId="fa3c34b288dc686c" providerId="LiveId" clId="{1089C391-FFDE-4EC2-B73C-58CF154F0003}" dt="2023-02-08T21:20:07.082" v="2" actId="478"/>
+        <pc:sldMkLst>
+          <pc:docMk/>
+          <pc:sldMk cId="3851585416" sldId="276"/>
+        </pc:sldMkLst>
+        <pc:spChg chg="del mod">
+          <ac:chgData name="Silvia Wen" userId="fa3c34b288dc686c" providerId="LiveId" clId="{1089C391-FFDE-4EC2-B73C-58CF154F0003}" dt="2023-02-08T21:20:06.460" v="1" actId="478"/>
+          <ac:spMkLst>
+            <pc:docMk/>
+            <pc:sldMk cId="3851585416" sldId="276"/>
+            <ac:spMk id="3" creationId="{4653A6F2-7C5E-4F59-0BB4-5911FF91FD0F}"/>
+          </ac:spMkLst>
+        </pc:spChg>
+        <pc:cxnChg chg="del mod">
+          <ac:chgData name="Silvia Wen" userId="fa3c34b288dc686c" providerId="LiveId" clId="{1089C391-FFDE-4EC2-B73C-58CF154F0003}" dt="2023-02-08T21:20:07.082" v="2" actId="478"/>
+          <ac:cxnSpMkLst>
+            <pc:docMk/>
+            <pc:sldMk cId="3851585416" sldId="276"/>
+            <ac:cxnSpMk id="14" creationId="{821C779E-8EF3-80DE-7F32-0C77453FF4D1}"/>
+          </ac:cxnSpMkLst>
+        </pc:cxnChg>
+      </pc:sldChg>
+      <pc:sldChg chg="addSp delSp modSp mod">
+        <pc:chgData name="Silvia Wen" userId="fa3c34b288dc686c" providerId="LiveId" clId="{1089C391-FFDE-4EC2-B73C-58CF154F0003}" dt="2023-02-08T21:24:44.821" v="72" actId="1076"/>
+        <pc:sldMkLst>
+          <pc:docMk/>
+          <pc:sldMk cId="0" sldId="288"/>
+        </pc:sldMkLst>
+        <pc:spChg chg="del">
+          <ac:chgData name="Silvia Wen" userId="fa3c34b288dc686c" providerId="LiveId" clId="{1089C391-FFDE-4EC2-B73C-58CF154F0003}" dt="2023-02-08T21:24:28.361" v="70" actId="478"/>
+          <ac:spMkLst>
+            <pc:docMk/>
+            <pc:sldMk cId="0" sldId="288"/>
+            <ac:spMk id="17" creationId="{AD3DD3EB-A5B9-04A2-F0BC-2E9BC4791E5B}"/>
+          </ac:spMkLst>
+        </pc:spChg>
+        <pc:picChg chg="add mod">
+          <ac:chgData name="Silvia Wen" userId="fa3c34b288dc686c" providerId="LiveId" clId="{1089C391-FFDE-4EC2-B73C-58CF154F0003}" dt="2023-02-08T21:24:44.821" v="72" actId="1076"/>
+          <ac:picMkLst>
+            <pc:docMk/>
+            <pc:sldMk cId="0" sldId="288"/>
+            <ac:picMk id="3" creationId="{8475CA77-0231-736E-F08F-31E38A973EAA}"/>
+          </ac:picMkLst>
+        </pc:picChg>
+        <pc:picChg chg="del">
+          <ac:chgData name="Silvia Wen" userId="fa3c34b288dc686c" providerId="LiveId" clId="{1089C391-FFDE-4EC2-B73C-58CF154F0003}" dt="2023-02-08T21:24:27.417" v="69" actId="478"/>
+          <ac:picMkLst>
+            <pc:docMk/>
+            <pc:sldMk cId="0" sldId="288"/>
+            <ac:picMk id="18" creationId="{2BADDB5A-FD23-7926-186F-87A9F49CA8E1}"/>
+          </ac:picMkLst>
+        </pc:picChg>
+      </pc:sldChg>
+      <pc:sldChg chg="addSp delSp modSp mod">
+        <pc:chgData name="Silvia Wen" userId="fa3c34b288dc686c" providerId="LiveId" clId="{1089C391-FFDE-4EC2-B73C-58CF154F0003}" dt="2023-02-08T21:21:15.375" v="12" actId="732"/>
+        <pc:sldMkLst>
+          <pc:docMk/>
+          <pc:sldMk cId="0" sldId="293"/>
+        </pc:sldMkLst>
+        <pc:picChg chg="add mod modCrop">
+          <ac:chgData name="Silvia Wen" userId="fa3c34b288dc686c" providerId="LiveId" clId="{1089C391-FFDE-4EC2-B73C-58CF154F0003}" dt="2023-02-08T21:21:15.375" v="12" actId="732"/>
+          <ac:picMkLst>
+            <pc:docMk/>
+            <pc:sldMk cId="0" sldId="293"/>
+            <ac:picMk id="4" creationId="{363B3C03-C452-3B13-55D2-BC8080278200}"/>
+          </ac:picMkLst>
+        </pc:picChg>
+        <pc:picChg chg="del">
+          <ac:chgData name="Silvia Wen" userId="fa3c34b288dc686c" providerId="LiveId" clId="{1089C391-FFDE-4EC2-B73C-58CF154F0003}" dt="2023-02-08T21:20:11.785" v="3" actId="478"/>
+          <ac:picMkLst>
+            <pc:docMk/>
+            <pc:sldMk cId="0" sldId="293"/>
+            <ac:picMk id="7" creationId="{27879B7A-F81C-B06D-6ECE-7CF5BFFA1473}"/>
+          </ac:picMkLst>
+        </pc:picChg>
+      </pc:sldChg>
+      <pc:sldChg chg="addSp modSp add mod ord">
+        <pc:chgData name="Silvia Wen" userId="fa3c34b288dc686c" providerId="LiveId" clId="{1089C391-FFDE-4EC2-B73C-58CF154F0003}" dt="2023-02-08T21:22:57.868" v="55"/>
+        <pc:sldMkLst>
+          <pc:docMk/>
+          <pc:sldMk cId="3831599231" sldId="299"/>
+        </pc:sldMkLst>
+        <pc:picChg chg="add mod">
+          <ac:chgData name="Silvia Wen" userId="fa3c34b288dc686c" providerId="LiveId" clId="{1089C391-FFDE-4EC2-B73C-58CF154F0003}" dt="2023-02-08T21:22:51.341" v="53" actId="1076"/>
+          <ac:picMkLst>
+            <pc:docMk/>
+            <pc:sldMk cId="3831599231" sldId="299"/>
+            <ac:picMk id="4" creationId="{DA1394A2-74A2-5B35-D1BB-C59A27F8460C}"/>
+          </ac:picMkLst>
+        </pc:picChg>
+      </pc:sldChg>
+      <pc:sldChg chg="addSp delSp modSp add del mod">
+        <pc:chgData name="Silvia Wen" userId="fa3c34b288dc686c" providerId="LiveId" clId="{1089C391-FFDE-4EC2-B73C-58CF154F0003}" dt="2023-02-08T21:23:12.376" v="59" actId="47"/>
+        <pc:sldMkLst>
+          <pc:docMk/>
+          <pc:sldMk cId="2763364179" sldId="300"/>
+        </pc:sldMkLst>
+        <pc:picChg chg="add del mod">
+          <ac:chgData name="Silvia Wen" userId="fa3c34b288dc686c" providerId="LiveId" clId="{1089C391-FFDE-4EC2-B73C-58CF154F0003}" dt="2023-02-08T21:23:09.723" v="58" actId="478"/>
+          <ac:picMkLst>
+            <pc:docMk/>
+            <pc:sldMk cId="2763364179" sldId="300"/>
+            <ac:picMk id="4" creationId="{B46CE365-BA10-798F-3B50-7BFDF8DE2207}"/>
+          </ac:picMkLst>
+        </pc:picChg>
+        <pc:picChg chg="add del mod">
+          <ac:chgData name="Silvia Wen" userId="fa3c34b288dc686c" providerId="LiveId" clId="{1089C391-FFDE-4EC2-B73C-58CF154F0003}" dt="2023-02-08T21:22:43.299" v="48" actId="478"/>
+          <ac:picMkLst>
+            <pc:docMk/>
+            <pc:sldMk cId="2763364179" sldId="300"/>
+            <ac:picMk id="6" creationId="{8CE4B145-4D81-7A5D-9923-14601C07B7F9}"/>
+          </ac:picMkLst>
+        </pc:picChg>
+      </pc:sldChg>
+    </pc:docChg>
+  </pc:docChgLst>
+</pc:chgInfo>
+</file>
+
 <file path=ppt/notesMasters/notesMaster1.xml><?xml version="1.0" encoding="utf-8"?>
 <p:notesMaster xmlns:a="http://schemas.openxmlformats.org/drawingml/2006/main" xmlns:r="http://schemas.openxmlformats.org/officeDocument/2006/relationships" xmlns:p="http://schemas.openxmlformats.org/presentationml/2006/main">
   <p:cSld>
@@ -237,7 +445,7 @@
           <a:p>
             <a:fld id="{A923DEBB-A8B7-4651-B065-888F326E9B5F}" type="datetimeFigureOut">
               <a:rPr lang="en-ID" smtClean="0"/>
-              <a:t>02/02/2023</a:t>
+              <a:t>08/02/2023</a:t>
             </a:fld>
             <a:endParaRPr lang="en-ID"/>
           </a:p>
@@ -396,7 +604,7 @@
           <a:p>
             <a:fld id="{4C7363D8-BE64-4D75-837D-10AB2CA52B9B}" type="slidenum">
               <a:rPr lang="en-ID" smtClean="0"/>
-              <a:t>‹#›</a:t>
+              <a:t>‹Nr.›</a:t>
             </a:fld>
             <a:endParaRPr lang="en-ID"/>
           </a:p>
@@ -655,7 +863,7 @@
             </a:pPr>
             <a:fld id="{911D8C60-1F2D-4436-BF53-22882F494404}" type="datetimeFigureOut">
               <a:rPr lang="de-DE"/>
-              <a:t>02.02.2023</a:t>
+              <a:t>08.02.2023</a:t>
             </a:fld>
             <a:endParaRPr lang="de-DE"/>
           </a:p>
@@ -727,7 +935,7 @@
             </a:pPr>
             <a:fld id="{83B23FF1-3F66-4904-91CE-1AE4A5050627}" type="slidenum">
               <a:rPr lang="de-DE"/>
-              <a:t>‹#›</a:t>
+              <a:t>‹Nr.›</a:t>
             </a:fld>
             <a:endParaRPr lang="de-DE"/>
           </a:p>
@@ -1170,7 +1378,7 @@
                   <a:srgbClr val="808080"/>
                 </a:solidFill>
               </a:rPr>
-              <a:t>‹#›</a:t>
+              <a:t>‹Nr.›</a:t>
             </a:fld>
             <a:endParaRPr lang="de-DE" sz="1100">
               <a:solidFill>
@@ -1903,46 +2111,6 @@
       </p:grpSpPr>
       <p:cxnSp>
         <p:nvCxnSpPr>
-          <p:cNvPr id="14" name="Straight Connector 13">
-            <a:extLst>
-              <a:ext uri="{FF2B5EF4-FFF2-40B4-BE49-F238E27FC236}">
-                <a16:creationId xmlns:a16="http://schemas.microsoft.com/office/drawing/2014/main" id="{821C779E-8EF3-80DE-7F32-0C77453FF4D1}"/>
-              </a:ext>
-            </a:extLst>
-          </p:cNvPr>
-          <p:cNvCxnSpPr>
-            <a:cxnSpLocks/>
-            <a:stCxn id="3" idx="0"/>
-          </p:cNvCxnSpPr>
-          <p:nvPr/>
-        </p:nvCxnSpPr>
-        <p:spPr bwMode="auto">
-          <a:xfrm flipH="1" flipV="1">
-            <a:off x="6462953" y="3348105"/>
-            <a:ext cx="597267" cy="661523"/>
-          </a:xfrm>
-          <a:prstGeom prst="line">
-            <a:avLst/>
-          </a:prstGeom>
-          <a:ln/>
-        </p:spPr>
-        <p:style>
-          <a:lnRef idx="2">
-            <a:schemeClr val="dk1"/>
-          </a:lnRef>
-          <a:fillRef idx="0">
-            <a:schemeClr val="dk1"/>
-          </a:fillRef>
-          <a:effectRef idx="1">
-            <a:schemeClr val="dk1"/>
-          </a:effectRef>
-          <a:fontRef idx="minor">
-            <a:schemeClr val="tx1"/>
-          </a:fontRef>
-        </p:style>
-      </p:cxnSp>
-      <p:cxnSp>
-        <p:nvCxnSpPr>
           <p:cNvPr id="7" name="Straight Connector 6">
             <a:extLst>
               <a:ext uri="{FF2B5EF4-FFF2-40B4-BE49-F238E27FC236}">
@@ -2295,42 +2463,6 @@
           </a:p>
         </p:txBody>
       </p:sp>
-      <p:sp>
-        <p:nvSpPr>
-          <p:cNvPr id="3" name="TextBox 2">
-            <a:extLst>
-              <a:ext uri="{FF2B5EF4-FFF2-40B4-BE49-F238E27FC236}">
-                <a16:creationId xmlns:a16="http://schemas.microsoft.com/office/drawing/2014/main" id="{4653A6F2-7C5E-4F59-0BB4-5911FF91FD0F}"/>
-              </a:ext>
-            </a:extLst>
-          </p:cNvPr>
-          <p:cNvSpPr txBox="1"/>
-          <p:nvPr/>
-        </p:nvSpPr>
-        <p:spPr>
-          <a:xfrm>
-            <a:off x="6592168" y="4009628"/>
-            <a:ext cx="936104" cy="307777"/>
-          </a:xfrm>
-          <a:prstGeom prst="rect">
-            <a:avLst/>
-          </a:prstGeom>
-          <a:noFill/>
-        </p:spPr>
-        <p:txBody>
-          <a:bodyPr wrap="square" rtlCol="0">
-            <a:spAutoFit/>
-          </a:bodyPr>
-          <a:lstStyle/>
-          <a:p>
-            <a:r>
-              <a:rPr lang="de-DE" sz="1400" dirty="0"/>
-              <a:t>Scanner</a:t>
-            </a:r>
-            <a:endParaRPr lang="en-ID" dirty="0"/>
-          </a:p>
-        </p:txBody>
-      </p:sp>
     </p:spTree>
     <p:extLst>
       <p:ext uri="{BB962C8B-B14F-4D97-AF65-F5344CB8AC3E}">
@@ -2387,37 +2519,12 @@
           </a:p>
         </p:txBody>
       </p:sp>
-      <p:sp>
-        <p:nvSpPr>
-          <p:cNvPr id="17" name="Content Placeholder 16">
+      <p:pic>
+        <p:nvPicPr>
+          <p:cNvPr id="3" name="Grafik 2">
             <a:extLst>
               <a:ext uri="{FF2B5EF4-FFF2-40B4-BE49-F238E27FC236}">
-                <a16:creationId xmlns:a16="http://schemas.microsoft.com/office/drawing/2014/main" id="{AD3DD3EB-A5B9-04A2-F0BC-2E9BC4791E5B}"/>
-              </a:ext>
-            </a:extLst>
-          </p:cNvPr>
-          <p:cNvSpPr>
-            <a:spLocks noGrp="1"/>
-          </p:cNvSpPr>
-          <p:nvPr>
-            <p:ph idx="1"/>
-          </p:nvPr>
-        </p:nvSpPr>
-        <p:spPr/>
-        <p:txBody>
-          <a:bodyPr/>
-          <a:lstStyle/>
-          <a:p>
-            <a:endParaRPr lang="en-ID"/>
-          </a:p>
-        </p:txBody>
-      </p:sp>
-      <p:pic>
-        <p:nvPicPr>
-          <p:cNvPr id="18" name="Picture 17">
-            <a:extLst>
-              <a:ext uri="{FF2B5EF4-FFF2-40B4-BE49-F238E27FC236}">
-                <a16:creationId xmlns:a16="http://schemas.microsoft.com/office/drawing/2014/main" id="{2BADDB5A-FD23-7926-186F-87A9F49CA8E1}"/>
+                <a16:creationId xmlns:a16="http://schemas.microsoft.com/office/drawing/2014/main" id="{8475CA77-0231-736E-F08F-31E38A973EAA}"/>
               </a:ext>
             </a:extLst>
           </p:cNvPr>
@@ -2438,10 +2545,10 @@
             <a:fillRect/>
           </a:stretch>
         </p:blipFill>
-        <p:spPr bwMode="auto">
+        <p:spPr>
           <a:xfrm>
-            <a:off x="1325319" y="1299040"/>
-            <a:ext cx="7188344" cy="3845764"/>
+            <a:off x="1741152" y="1201316"/>
+            <a:ext cx="6356677" cy="4076910"/>
           </a:xfrm>
           <a:prstGeom prst="rect">
             <a:avLst/>
@@ -3104,10 +3211,10 @@
       </p:sp>
       <p:pic>
         <p:nvPicPr>
-          <p:cNvPr id="7" name="Picture 6">
+          <p:cNvPr id="4" name="Grafik 3">
             <a:extLst>
               <a:ext uri="{FF2B5EF4-FFF2-40B4-BE49-F238E27FC236}">
-                <a16:creationId xmlns:a16="http://schemas.microsoft.com/office/drawing/2014/main" id="{27879B7A-F81C-B06D-6ECE-7CF5BFFA1473}"/>
+                <a16:creationId xmlns:a16="http://schemas.microsoft.com/office/drawing/2014/main" id="{363B3C03-C452-3B13-55D2-BC8080278200}"/>
               </a:ext>
             </a:extLst>
           </p:cNvPr>
@@ -3124,13 +3231,13 @@
               </a:ext>
             </a:extLst>
           </a:blip>
-          <a:srcRect b="44960"/>
+          <a:srcRect t="-1" b="43266"/>
           <a:stretch/>
         </p:blipFill>
         <p:spPr>
           <a:xfrm>
-            <a:off x="1983656" y="1561356"/>
-            <a:ext cx="5881777" cy="3753796"/>
+            <a:off x="1767632" y="1561357"/>
+            <a:ext cx="5976664" cy="3744416"/>
           </a:xfrm>
           <a:prstGeom prst="rect">
             <a:avLst/>
@@ -4337,10 +4444,10 @@
       </p:pic>
       <p:pic>
         <p:nvPicPr>
-          <p:cNvPr id="5" name="Picture 4">
+          <p:cNvPr id="4" name="Grafik 3" descr="Ein Bild, das Text enthält.&#10;&#10;Automatisch generierte Beschreibung">
             <a:extLst>
               <a:ext uri="{FF2B5EF4-FFF2-40B4-BE49-F238E27FC236}">
-                <a16:creationId xmlns:a16="http://schemas.microsoft.com/office/drawing/2014/main" id="{8D568121-278A-6160-790D-96EE234F57F7}"/>
+                <a16:creationId xmlns:a16="http://schemas.microsoft.com/office/drawing/2014/main" id="{B614220C-52EF-6B79-B8AD-8D481635475F}"/>
               </a:ext>
             </a:extLst>
           </p:cNvPr>
@@ -4350,15 +4457,21 @@
           <p:nvPr/>
         </p:nvPicPr>
         <p:blipFill>
-          <a:blip r:embed="rId3"/>
+          <a:blip r:embed="rId3">
+            <a:extLst>
+              <a:ext uri="{28A0092B-C50C-407E-A947-70E740481C1C}">
+                <a14:useLocalDpi xmlns:a14="http://schemas.microsoft.com/office/drawing/2010/main" val="0"/>
+              </a:ext>
+            </a:extLst>
+          </a:blip>
           <a:stretch>
             <a:fillRect/>
           </a:stretch>
         </p:blipFill>
         <p:spPr>
           <a:xfrm>
-            <a:off x="4935984" y="2050298"/>
-            <a:ext cx="3282030" cy="1614404"/>
+            <a:off x="5109621" y="2281436"/>
+            <a:ext cx="2895851" cy="1348857"/>
           </a:xfrm>
           <a:prstGeom prst="rect">
             <a:avLst/>
@@ -4418,13 +4531,17 @@
       </p:sp>
       <p:pic>
         <p:nvPicPr>
-          <p:cNvPr id="3074" name="Picture 2"/>
+          <p:cNvPr id="4" name="Grafik 3" descr="Ein Bild, das Text enthält.&#10;&#10;Automatisch generierte Beschreibung">
+            <a:extLst>
+              <a:ext uri="{FF2B5EF4-FFF2-40B4-BE49-F238E27FC236}">
+                <a16:creationId xmlns:a16="http://schemas.microsoft.com/office/drawing/2014/main" id="{DA1394A2-74A2-5B35-D1BB-C59A27F8460C}"/>
+              </a:ext>
+            </a:extLst>
+          </p:cNvPr>
           <p:cNvPicPr>
-            <a:picLocks noGrp="1" noChangeAspect="1" noChangeArrowheads="1"/>
+            <a:picLocks noChangeAspect="1"/>
           </p:cNvPicPr>
-          <p:nvPr>
-            <p:ph idx="1"/>
-          </p:nvPr>
+          <p:nvPr/>
         </p:nvPicPr>
         <p:blipFill>
           <a:blip r:embed="rId2">
@@ -4434,42 +4551,146 @@
               </a:ext>
             </a:extLst>
           </a:blip>
-          <a:srcRect/>
           <a:stretch>
             <a:fillRect/>
           </a:stretch>
         </p:blipFill>
-        <p:spPr bwMode="auto">
+        <p:spPr>
           <a:xfrm>
-            <a:off x="1695624" y="1184640"/>
-            <a:ext cx="6120680" cy="3833448"/>
+            <a:off x="1371379" y="1299847"/>
+            <a:ext cx="7096224" cy="3862983"/>
           </a:xfrm>
           <a:prstGeom prst="rect">
             <a:avLst/>
           </a:prstGeom>
-          <a:noFill/>
-          <a:ln>
-            <a:noFill/>
-          </a:ln>
-          <a:extLst>
-            <a:ext uri="{909E8E84-426E-40DD-AFC4-6F175D3DCCD1}">
-              <a14:hiddenFill xmlns:a14="http://schemas.microsoft.com/office/drawing/2010/main">
-                <a:solidFill>
-                  <a:schemeClr val="accent1"/>
-                </a:solidFill>
-              </a14:hiddenFill>
-            </a:ext>
-            <a:ext uri="{91240B29-F687-4F45-9708-019B960494DF}">
-              <a14:hiddenLine xmlns:a14="http://schemas.microsoft.com/office/drawing/2010/main" w="9525">
-                <a:solidFill>
-                  <a:schemeClr val="tx1"/>
-                </a:solidFill>
-                <a:miter lim="800000"/>
-                <a:headEnd/>
-                <a:tailEnd/>
-              </a14:hiddenLine>
-            </a:ext>
-          </a:extLst>
+        </p:spPr>
+      </p:pic>
+    </p:spTree>
+    <p:extLst>
+      <p:ext uri="{BB962C8B-B14F-4D97-AF65-F5344CB8AC3E}">
+        <p14:creationId xmlns:p14="http://schemas.microsoft.com/office/powerpoint/2010/main" val="3831599231"/>
+      </p:ext>
+    </p:extLst>
+  </p:cSld>
+  <p:clrMapOvr>
+    <a:masterClrMapping/>
+  </p:clrMapOvr>
+</p:sld>
+</file>
+
+<file path=ppt/slides/slide25.xml><?xml version="1.0" encoding="utf-8"?>
+<p:sld xmlns:a="http://schemas.openxmlformats.org/drawingml/2006/main" xmlns:r="http://schemas.openxmlformats.org/officeDocument/2006/relationships" xmlns:p="http://schemas.openxmlformats.org/presentationml/2006/main" showMasterPhAnim="0">
+  <p:cSld>
+    <p:spTree>
+      <p:nvGrpSpPr>
+        <p:cNvPr id="1" name=""/>
+        <p:cNvGrpSpPr/>
+        <p:nvPr/>
+      </p:nvGrpSpPr>
+      <p:grpSpPr bwMode="auto">
+        <a:xfrm>
+          <a:off x="0" y="0"/>
+          <a:ext cx="0" cy="0"/>
+          <a:chOff x="0" y="0"/>
+          <a:chExt cx="0" cy="0"/>
+        </a:xfrm>
+      </p:grpSpPr>
+      <p:sp>
+        <p:nvSpPr>
+          <p:cNvPr id="3" name="Titel 2"/>
+          <p:cNvSpPr>
+            <a:spLocks noGrp="1"/>
+          </p:cNvSpPr>
+          <p:nvPr>
+            <p:ph type="title"/>
+          </p:nvPr>
+        </p:nvSpPr>
+        <p:spPr bwMode="auto"/>
+        <p:txBody>
+          <a:bodyPr/>
+          <a:lstStyle/>
+          <a:p>
+            <a:pPr>
+              <a:defRPr/>
+            </a:pPr>
+            <a:r>
+              <a:rPr lang="de-DE"/>
+              <a:t>Präsentation der Testfälle </a:t>
+            </a:r>
+            <a:endParaRPr/>
+          </a:p>
+        </p:txBody>
+      </p:sp>
+      <p:pic>
+        <p:nvPicPr>
+          <p:cNvPr id="7" name="Grafik 6" descr="Ein Bild, das Text enthält.&#10;&#10;Automatisch generierte Beschreibung">
+            <a:extLst>
+              <a:ext uri="{FF2B5EF4-FFF2-40B4-BE49-F238E27FC236}">
+                <a16:creationId xmlns:a16="http://schemas.microsoft.com/office/drawing/2014/main" id="{D0F1D42C-2DF5-435F-7834-7A82170957F1}"/>
+              </a:ext>
+            </a:extLst>
+          </p:cNvPr>
+          <p:cNvPicPr>
+            <a:picLocks noChangeAspect="1"/>
+          </p:cNvPicPr>
+          <p:nvPr/>
+        </p:nvPicPr>
+        <p:blipFill>
+          <a:blip r:embed="rId2">
+            <a:extLst>
+              <a:ext uri="{28A0092B-C50C-407E-A947-70E740481C1C}">
+                <a14:useLocalDpi xmlns:a14="http://schemas.microsoft.com/office/drawing/2010/main" val="0"/>
+              </a:ext>
+            </a:extLst>
+          </a:blip>
+          <a:stretch>
+            <a:fillRect/>
+          </a:stretch>
+        </p:blipFill>
+        <p:spPr>
+          <a:xfrm>
+            <a:off x="687512" y="1475166"/>
+            <a:ext cx="4021479" cy="3381511"/>
+          </a:xfrm>
+          <a:prstGeom prst="rect">
+            <a:avLst/>
+          </a:prstGeom>
+        </p:spPr>
+      </p:pic>
+      <p:pic>
+        <p:nvPicPr>
+          <p:cNvPr id="9" name="Grafik 8" descr="Ein Bild, das Text enthält.&#10;&#10;Automatisch generierte Beschreibung">
+            <a:extLst>
+              <a:ext uri="{FF2B5EF4-FFF2-40B4-BE49-F238E27FC236}">
+                <a16:creationId xmlns:a16="http://schemas.microsoft.com/office/drawing/2014/main" id="{08ECD5E4-CCA6-1B34-210E-D4BA245C5F6B}"/>
+              </a:ext>
+            </a:extLst>
+          </p:cNvPr>
+          <p:cNvPicPr>
+            <a:picLocks noChangeAspect="1"/>
+          </p:cNvPicPr>
+          <p:nvPr/>
+        </p:nvPicPr>
+        <p:blipFill>
+          <a:blip r:embed="rId3">
+            <a:extLst>
+              <a:ext uri="{28A0092B-C50C-407E-A947-70E740481C1C}">
+                <a14:useLocalDpi xmlns:a14="http://schemas.microsoft.com/office/drawing/2010/main" val="0"/>
+              </a:ext>
+            </a:extLst>
+          </a:blip>
+          <a:stretch>
+            <a:fillRect/>
+          </a:stretch>
+        </p:blipFill>
+        <p:spPr>
+          <a:xfrm>
+            <a:off x="5082569" y="1463765"/>
+            <a:ext cx="3804736" cy="3381512"/>
+          </a:xfrm>
+          <a:prstGeom prst="rect">
+            <a:avLst/>
+          </a:prstGeom>
         </p:spPr>
       </p:pic>
     </p:spTree>
@@ -4480,7 +4701,7 @@
 </p:sld>
 </file>
 
-<file path=ppt/slides/slide25.xml><?xml version="1.0" encoding="utf-8"?>
+<file path=ppt/slides/slide26.xml><?xml version="1.0" encoding="utf-8"?>
 <p:sld xmlns:a="http://schemas.openxmlformats.org/drawingml/2006/main" xmlns:r="http://schemas.openxmlformats.org/officeDocument/2006/relationships" xmlns:p="http://schemas.openxmlformats.org/presentationml/2006/main" showMasterPhAnim="0">
   <p:cSld>
     <p:spTree>
@@ -4587,7 +4808,7 @@
 </p:sld>
 </file>
 
-<file path=ppt/slides/slide26.xml><?xml version="1.0" encoding="utf-8"?>
+<file path=ppt/slides/slide27.xml><?xml version="1.0" encoding="utf-8"?>
 <p:sld xmlns:a="http://schemas.openxmlformats.org/drawingml/2006/main" xmlns:r="http://schemas.openxmlformats.org/officeDocument/2006/relationships" xmlns:p="http://schemas.openxmlformats.org/presentationml/2006/main">
   <p:cSld>
     <p:spTree>
@@ -4697,7 +4918,7 @@
 </p:sld>
 </file>
 
-<file path=ppt/slides/slide27.xml><?xml version="1.0" encoding="utf-8"?>
+<file path=ppt/slides/slide28.xml><?xml version="1.0" encoding="utf-8"?>
 <p:sld xmlns:a="http://schemas.openxmlformats.org/drawingml/2006/main" xmlns:r="http://schemas.openxmlformats.org/officeDocument/2006/relationships" xmlns:p="http://schemas.openxmlformats.org/presentationml/2006/main">
   <p:cSld>
     <p:spTree>

</xml_diff>

<commit_message>
added metrics and updated presentation
</commit_message>
<xml_diff>
--- a/prototype/Praesentation_Vorlage_OOP_2023_2_OOP.pptx
+++ b/prototype/Praesentation_Vorlage_OOP_2023_2_OOP.pptx
@@ -5,7 +5,7 @@
     <p:sldMasterId id="2147483648" r:id="rId1"/>
   </p:sldMasterIdLst>
   <p:notesMasterIdLst>
-    <p:notesMasterId r:id="rId30"/>
+    <p:notesMasterId r:id="rId31"/>
   </p:notesMasterIdLst>
   <p:sldIdLst>
     <p:sldId id="256" r:id="rId2"/>
@@ -36,6 +36,7 @@
     <p:sldId id="272" r:id="rId27"/>
     <p:sldId id="295" r:id="rId28"/>
     <p:sldId id="294" r:id="rId29"/>
+    <p:sldId id="300" r:id="rId30"/>
   </p:sldIdLst>
   <p:sldSz cx="10160000" cy="5715000"/>
   <p:notesSz cx="10160000" cy="5715000"/>
@@ -136,7 +137,7 @@
   </p:defaultTextStyle>
   <p:extLst>
     <p:ext uri="{EFAFB233-063F-42B5-8137-9DF3F51BA10A}">
-      <p15:sldGuideLst xmlns:p15="http://schemas.microsoft.com/office/powerpoint/2012/main">
+      <p15:sldGuideLst xmlns:p15="http://schemas.microsoft.com/office/powerpoint/2012/main" xmlns="">
         <p15:guide id="1" orient="horz" pos="2160">
           <p15:clr>
             <a:srgbClr val="A4A3A4"/>
@@ -150,7 +151,7 @@
       </p15:sldGuideLst>
     </p:ext>
     <p:ext uri="{2D200454-40CA-4A62-9FC3-DE9A4176ACB9}">
-      <p15:notesGuideLst xmlns:p15="http://schemas.microsoft.com/office/powerpoint/2012/main"/>
+      <p15:notesGuideLst xmlns:p15="http://schemas.microsoft.com/office/powerpoint/2012/main" xmlns=""/>
     </p:ext>
   </p:extLst>
 </p:presentation>
@@ -604,7 +605,7 @@
           <a:p>
             <a:fld id="{4C7363D8-BE64-4D75-837D-10AB2CA52B9B}" type="slidenum">
               <a:rPr lang="en-ID" smtClean="0"/>
-              <a:t>‹Nr.›</a:t>
+              <a:t>‹#›</a:t>
             </a:fld>
             <a:endParaRPr lang="en-ID"/>
           </a:p>
@@ -935,7 +936,7 @@
             </a:pPr>
             <a:fld id="{83B23FF1-3F66-4904-91CE-1AE4A5050627}" type="slidenum">
               <a:rPr lang="de-DE"/>
-              <a:t>‹Nr.›</a:t>
+              <a:t>‹#›</a:t>
             </a:fld>
             <a:endParaRPr lang="de-DE"/>
           </a:p>
@@ -1378,7 +1379,7 @@
                   <a:srgbClr val="808080"/>
                 </a:solidFill>
               </a:rPr>
-              <a:t>‹Nr.›</a:t>
+              <a:t>‹#›</a:t>
             </a:fld>
             <a:endParaRPr lang="de-DE" sz="1100">
               <a:solidFill>
@@ -2114,7 +2115,7 @@
           <p:cNvPr id="7" name="Straight Connector 6">
             <a:extLst>
               <a:ext uri="{FF2B5EF4-FFF2-40B4-BE49-F238E27FC236}">
-                <a16:creationId xmlns:a16="http://schemas.microsoft.com/office/drawing/2014/main" id="{26317280-AFFA-15C9-E277-5437F436DDD4}"/>
+                <a16:creationId xmlns:a16="http://schemas.microsoft.com/office/drawing/2014/main" xmlns="" id="{26317280-AFFA-15C9-E277-5437F436DDD4}"/>
               </a:ext>
             </a:extLst>
           </p:cNvPr>
@@ -2184,7 +2185,7 @@
           <p:cNvPr id="9" name="Picture 2" descr="Diebold Nixdorf inks a deal with bank99 for ATM network management">
             <a:extLst>
               <a:ext uri="{FF2B5EF4-FFF2-40B4-BE49-F238E27FC236}">
-                <a16:creationId xmlns:a16="http://schemas.microsoft.com/office/drawing/2014/main" id="{CAD2B3CE-B5E3-8F93-6B29-6703CE07C7BD}"/>
+                <a16:creationId xmlns:a16="http://schemas.microsoft.com/office/drawing/2014/main" xmlns="" id="{CAD2B3CE-B5E3-8F93-6B29-6703CE07C7BD}"/>
               </a:ext>
             </a:extLst>
           </p:cNvPr>
@@ -2282,7 +2283,7 @@
           <p:cNvPr id="13" name="TextBox 12">
             <a:extLst>
               <a:ext uri="{FF2B5EF4-FFF2-40B4-BE49-F238E27FC236}">
-                <a16:creationId xmlns:a16="http://schemas.microsoft.com/office/drawing/2014/main" id="{C5EF9B15-FA07-E32F-7F4D-34F8A046AE0C}"/>
+                <a16:creationId xmlns:a16="http://schemas.microsoft.com/office/drawing/2014/main" xmlns="" id="{C5EF9B15-FA07-E32F-7F4D-34F8A046AE0C}"/>
               </a:ext>
             </a:extLst>
           </p:cNvPr>
@@ -2318,7 +2319,7 @@
           <p:cNvPr id="21" name="Graphic 20" descr="User">
             <a:extLst>
               <a:ext uri="{FF2B5EF4-FFF2-40B4-BE49-F238E27FC236}">
-                <a16:creationId xmlns:a16="http://schemas.microsoft.com/office/drawing/2014/main" id="{966ED70C-983D-CACD-04DF-A7710305E8E3}"/>
+                <a16:creationId xmlns:a16="http://schemas.microsoft.com/office/drawing/2014/main" xmlns="" id="{966ED70C-983D-CACD-04DF-A7710305E8E3}"/>
               </a:ext>
             </a:extLst>
           </p:cNvPr>
@@ -2334,7 +2335,7 @@
                 <a14:useLocalDpi xmlns:a14="http://schemas.microsoft.com/office/drawing/2010/main" val="0"/>
               </a:ext>
               <a:ext uri="{96DAC541-7B7A-43D3-8B79-37D633B846F1}">
-                <asvg:svgBlip xmlns:asvg="http://schemas.microsoft.com/office/drawing/2016/SVG/main" r:embed="rId5"/>
+                <asvg:svgBlip xmlns:asvg="http://schemas.microsoft.com/office/drawing/2016/SVG/main" xmlns="" r:embed="rId5"/>
               </a:ext>
             </a:extLst>
           </a:blip>
@@ -2357,7 +2358,7 @@
           <p:cNvPr id="24" name="TextBox 23">
             <a:extLst>
               <a:ext uri="{FF2B5EF4-FFF2-40B4-BE49-F238E27FC236}">
-                <a16:creationId xmlns:a16="http://schemas.microsoft.com/office/drawing/2014/main" id="{4A12341E-82B0-5B47-CA9F-9390CE970E41}"/>
+                <a16:creationId xmlns:a16="http://schemas.microsoft.com/office/drawing/2014/main" xmlns="" id="{4A12341E-82B0-5B47-CA9F-9390CE970E41}"/>
               </a:ext>
             </a:extLst>
           </p:cNvPr>
@@ -2393,7 +2394,7 @@
           <p:cNvPr id="27" name="Straight Connector 26">
             <a:extLst>
               <a:ext uri="{FF2B5EF4-FFF2-40B4-BE49-F238E27FC236}">
-                <a16:creationId xmlns:a16="http://schemas.microsoft.com/office/drawing/2014/main" id="{6B752903-6222-6110-A2CA-693C8C006B99}"/>
+                <a16:creationId xmlns:a16="http://schemas.microsoft.com/office/drawing/2014/main" xmlns="" id="{6B752903-6222-6110-A2CA-693C8C006B99}"/>
               </a:ext>
             </a:extLst>
           </p:cNvPr>
@@ -2432,7 +2433,7 @@
           <p:cNvPr id="2" name="TextBox 1">
             <a:extLst>
               <a:ext uri="{FF2B5EF4-FFF2-40B4-BE49-F238E27FC236}">
-                <a16:creationId xmlns:a16="http://schemas.microsoft.com/office/drawing/2014/main" id="{82CD9FC1-02A8-8A5A-09A7-6D93AF4BE01F}"/>
+                <a16:creationId xmlns:a16="http://schemas.microsoft.com/office/drawing/2014/main" xmlns="" id="{82CD9FC1-02A8-8A5A-09A7-6D93AF4BE01F}"/>
               </a:ext>
             </a:extLst>
           </p:cNvPr>
@@ -2524,7 +2525,7 @@
           <p:cNvPr id="3" name="Grafik 2">
             <a:extLst>
               <a:ext uri="{FF2B5EF4-FFF2-40B4-BE49-F238E27FC236}">
-                <a16:creationId xmlns:a16="http://schemas.microsoft.com/office/drawing/2014/main" id="{8475CA77-0231-736E-F08F-31E38A973EAA}"/>
+                <a16:creationId xmlns:a16="http://schemas.microsoft.com/office/drawing/2014/main" xmlns="" id="{8475CA77-0231-736E-F08F-31E38A973EAA}"/>
               </a:ext>
             </a:extLst>
           </p:cNvPr>
@@ -2643,7 +2644,7 @@
           <p:cNvPr id="3" name="Picture 2">
             <a:extLst>
               <a:ext uri="{FF2B5EF4-FFF2-40B4-BE49-F238E27FC236}">
-                <a16:creationId xmlns:a16="http://schemas.microsoft.com/office/drawing/2014/main" id="{A2277A1D-FE6E-61AC-FCE4-32E1BE5224FE}"/>
+                <a16:creationId xmlns:a16="http://schemas.microsoft.com/office/drawing/2014/main" xmlns="" id="{A2277A1D-FE6E-61AC-FCE4-32E1BE5224FE}"/>
               </a:ext>
             </a:extLst>
           </p:cNvPr>
@@ -2730,7 +2731,7 @@
           <p:cNvPr id="6" name="Inhaltsplatzhalter 5">
             <a:extLst>
               <a:ext uri="{FF2B5EF4-FFF2-40B4-BE49-F238E27FC236}">
-                <a16:creationId xmlns:a16="http://schemas.microsoft.com/office/drawing/2014/main" id="{20A3C10B-BE22-4BB4-1975-7E785A4229B5}"/>
+                <a16:creationId xmlns:a16="http://schemas.microsoft.com/office/drawing/2014/main" xmlns="" id="{20A3C10B-BE22-4BB4-1975-7E785A4229B5}"/>
               </a:ext>
             </a:extLst>
           </p:cNvPr>
@@ -2765,7 +2766,7 @@
           <p:cNvPr id="2" name="Picture 2">
             <a:extLst>
               <a:ext uri="{FF2B5EF4-FFF2-40B4-BE49-F238E27FC236}">
-                <a16:creationId xmlns:a16="http://schemas.microsoft.com/office/drawing/2014/main" id="{02F275F0-6419-2996-FE33-7AE0CF3920B4}"/>
+                <a16:creationId xmlns:a16="http://schemas.microsoft.com/office/drawing/2014/main" xmlns="" id="{02F275F0-6419-2996-FE33-7AE0CF3920B4}"/>
               </a:ext>
             </a:extLst>
           </p:cNvPr>
@@ -2801,7 +2802,7 @@
           <p:cNvPr id="5" name="Gerade Verbindung mit Pfeil 4">
             <a:extLst>
               <a:ext uri="{FF2B5EF4-FFF2-40B4-BE49-F238E27FC236}">
-                <a16:creationId xmlns:a16="http://schemas.microsoft.com/office/drawing/2014/main" id="{A902F25D-EA25-8C19-851D-CAC2FE941C19}"/>
+                <a16:creationId xmlns:a16="http://schemas.microsoft.com/office/drawing/2014/main" xmlns="" id="{A902F25D-EA25-8C19-851D-CAC2FE941C19}"/>
               </a:ext>
             </a:extLst>
           </p:cNvPr>
@@ -2842,7 +2843,7 @@
           <p:cNvPr id="8" name="Gerade Verbindung mit Pfeil 7">
             <a:extLst>
               <a:ext uri="{FF2B5EF4-FFF2-40B4-BE49-F238E27FC236}">
-                <a16:creationId xmlns:a16="http://schemas.microsoft.com/office/drawing/2014/main" id="{70CA491C-E035-D9D4-7179-1643CD61DF8E}"/>
+                <a16:creationId xmlns:a16="http://schemas.microsoft.com/office/drawing/2014/main" xmlns="" id="{70CA491C-E035-D9D4-7179-1643CD61DF8E}"/>
               </a:ext>
             </a:extLst>
           </p:cNvPr>
@@ -2883,7 +2884,7 @@
           <p:cNvPr id="9" name="Verbinder: gewinkelt 8">
             <a:extLst>
               <a:ext uri="{FF2B5EF4-FFF2-40B4-BE49-F238E27FC236}">
-                <a16:creationId xmlns:a16="http://schemas.microsoft.com/office/drawing/2014/main" id="{5FC0E4E4-676C-37C0-EE26-69403D31F132}"/>
+                <a16:creationId xmlns:a16="http://schemas.microsoft.com/office/drawing/2014/main" xmlns="" id="{5FC0E4E4-676C-37C0-EE26-69403D31F132}"/>
               </a:ext>
             </a:extLst>
           </p:cNvPr>
@@ -2926,7 +2927,7 @@
           <p:cNvPr id="21" name="Verbinder: gewinkelt 20">
             <a:extLst>
               <a:ext uri="{FF2B5EF4-FFF2-40B4-BE49-F238E27FC236}">
-                <a16:creationId xmlns:a16="http://schemas.microsoft.com/office/drawing/2014/main" id="{1CD258BB-31E6-3467-A612-E64178620882}"/>
+                <a16:creationId xmlns:a16="http://schemas.microsoft.com/office/drawing/2014/main" xmlns="" id="{1CD258BB-31E6-3467-A612-E64178620882}"/>
               </a:ext>
             </a:extLst>
           </p:cNvPr>
@@ -3027,7 +3028,7 @@
           <p:cNvPr id="6" name="Content Placeholder 5">
             <a:extLst>
               <a:ext uri="{FF2B5EF4-FFF2-40B4-BE49-F238E27FC236}">
-                <a16:creationId xmlns:a16="http://schemas.microsoft.com/office/drawing/2014/main" id="{36222083-9675-1777-F9ED-89997080D102}"/>
+                <a16:creationId xmlns:a16="http://schemas.microsoft.com/office/drawing/2014/main" xmlns="" id="{36222083-9675-1777-F9ED-89997080D102}"/>
               </a:ext>
             </a:extLst>
           </p:cNvPr>
@@ -3120,7 +3121,7 @@
           <p:cNvPr id="5" name="Picture 4">
             <a:extLst>
               <a:ext uri="{FF2B5EF4-FFF2-40B4-BE49-F238E27FC236}">
-                <a16:creationId xmlns:a16="http://schemas.microsoft.com/office/drawing/2014/main" id="{6186830C-A930-1F01-8695-30CF8FCB2EBF}"/>
+                <a16:creationId xmlns:a16="http://schemas.microsoft.com/office/drawing/2014/main" xmlns="" id="{6186830C-A930-1F01-8695-30CF8FCB2EBF}"/>
               </a:ext>
             </a:extLst>
           </p:cNvPr>
@@ -3214,7 +3215,7 @@
           <p:cNvPr id="4" name="Grafik 3">
             <a:extLst>
               <a:ext uri="{FF2B5EF4-FFF2-40B4-BE49-F238E27FC236}">
-                <a16:creationId xmlns:a16="http://schemas.microsoft.com/office/drawing/2014/main" id="{363B3C03-C452-3B13-55D2-BC8080278200}"/>
+                <a16:creationId xmlns:a16="http://schemas.microsoft.com/office/drawing/2014/main" xmlns="" id="{363B3C03-C452-3B13-55D2-BC8080278200}"/>
               </a:ext>
             </a:extLst>
           </p:cNvPr>
@@ -3224,7 +3225,7 @@
           <p:nvPr/>
         </p:nvPicPr>
         <p:blipFill rotWithShape="1">
-          <a:blip r:embed="rId2">
+          <a:blip r:embed="rId2" cstate="print">
             <a:extLst>
               <a:ext uri="{28A0092B-C50C-407E-A947-70E740481C1C}">
                 <a14:useLocalDpi xmlns:a14="http://schemas.microsoft.com/office/drawing/2010/main" val="0"/>
@@ -3307,7 +3308,7 @@
           <p:cNvPr id="5" name="Picture 4">
             <a:extLst>
               <a:ext uri="{FF2B5EF4-FFF2-40B4-BE49-F238E27FC236}">
-                <a16:creationId xmlns:a16="http://schemas.microsoft.com/office/drawing/2014/main" id="{081731FC-25FD-129F-1B98-4BC272BD7B87}"/>
+                <a16:creationId xmlns:a16="http://schemas.microsoft.com/office/drawing/2014/main" xmlns="" id="{081731FC-25FD-129F-1B98-4BC272BD7B87}"/>
               </a:ext>
             </a:extLst>
           </p:cNvPr>
@@ -3398,7 +3399,7 @@
           <p:cNvPr id="6" name="Content Placeholder 5">
             <a:extLst>
               <a:ext uri="{FF2B5EF4-FFF2-40B4-BE49-F238E27FC236}">
-                <a16:creationId xmlns:a16="http://schemas.microsoft.com/office/drawing/2014/main" id="{6ED74517-3346-2B74-1BD8-2D8548C5ACE2}"/>
+                <a16:creationId xmlns:a16="http://schemas.microsoft.com/office/drawing/2014/main" xmlns="" id="{6ED74517-3346-2B74-1BD8-2D8548C5ACE2}"/>
               </a:ext>
             </a:extLst>
           </p:cNvPr>
@@ -3423,7 +3424,7 @@
           <p:cNvPr id="4" name="Picture 3">
             <a:extLst>
               <a:ext uri="{FF2B5EF4-FFF2-40B4-BE49-F238E27FC236}">
-                <a16:creationId xmlns:a16="http://schemas.microsoft.com/office/drawing/2014/main" id="{46F4067B-667B-547F-D672-5248954D0B83}"/>
+                <a16:creationId xmlns:a16="http://schemas.microsoft.com/office/drawing/2014/main" xmlns="" id="{46F4067B-667B-547F-D672-5248954D0B83}"/>
               </a:ext>
             </a:extLst>
           </p:cNvPr>
@@ -3822,6 +3823,15 @@
               <a:rPr lang="de-DE" dirty="0"/>
               <a:t>Anforderungstext – Bank</a:t>
             </a:r>
+            <a:r>
+              <a:rPr lang="de-DE" sz="2400" b="0" i="0" u="none" strike="noStrike" baseline="0" dirty="0">
+                <a:solidFill>
+                  <a:srgbClr val="4471C4"/>
+                </a:solidFill>
+                <a:latin typeface="Calibri" panose="020F0502020204030204" pitchFamily="34" charset="0"/>
+              </a:rPr>
+              <a:t/>
+            </a:r>
             <a:br>
               <a:rPr lang="de-DE" sz="2400" b="0" i="0" u="none" strike="noStrike" baseline="0" dirty="0">
                 <a:solidFill>
@@ -3965,7 +3975,7 @@
           <p:cNvPr id="4" name="Content Placeholder 3">
             <a:extLst>
               <a:ext uri="{FF2B5EF4-FFF2-40B4-BE49-F238E27FC236}">
-                <a16:creationId xmlns:a16="http://schemas.microsoft.com/office/drawing/2014/main" id="{9010E731-AA66-216E-5B70-E652E690C102}"/>
+                <a16:creationId xmlns:a16="http://schemas.microsoft.com/office/drawing/2014/main" xmlns="" id="{9010E731-AA66-216E-5B70-E652E690C102}"/>
               </a:ext>
             </a:extLst>
           </p:cNvPr>
@@ -3990,7 +4000,7 @@
           <p:cNvPr id="5" name="Picture 4">
             <a:extLst>
               <a:ext uri="{FF2B5EF4-FFF2-40B4-BE49-F238E27FC236}">
-                <a16:creationId xmlns:a16="http://schemas.microsoft.com/office/drawing/2014/main" id="{4FEDF282-BF85-630B-664A-2F15AA8C1B80}"/>
+                <a16:creationId xmlns:a16="http://schemas.microsoft.com/office/drawing/2014/main" xmlns="" id="{4FEDF282-BF85-630B-664A-2F15AA8C1B80}"/>
               </a:ext>
             </a:extLst>
           </p:cNvPr>
@@ -4235,7 +4245,7 @@
           <p:cNvPr id="4" name="Content Placeholder 3">
             <a:extLst>
               <a:ext uri="{FF2B5EF4-FFF2-40B4-BE49-F238E27FC236}">
-                <a16:creationId xmlns:a16="http://schemas.microsoft.com/office/drawing/2014/main" id="{1FF17E53-26A6-C999-F48F-D49E91B13BF6}"/>
+                <a16:creationId xmlns:a16="http://schemas.microsoft.com/office/drawing/2014/main" xmlns="" id="{1FF17E53-26A6-C999-F48F-D49E91B13BF6}"/>
               </a:ext>
             </a:extLst>
           </p:cNvPr>
@@ -4292,7 +4302,7 @@
           <p:cNvPr id="6" name="Picture 5">
             <a:extLst>
               <a:ext uri="{FF2B5EF4-FFF2-40B4-BE49-F238E27FC236}">
-                <a16:creationId xmlns:a16="http://schemas.microsoft.com/office/drawing/2014/main" id="{75E006CF-B38C-4D78-A308-61062552E542}"/>
+                <a16:creationId xmlns:a16="http://schemas.microsoft.com/office/drawing/2014/main" xmlns="" id="{75E006CF-B38C-4D78-A308-61062552E542}"/>
               </a:ext>
             </a:extLst>
           </p:cNvPr>
@@ -4417,7 +4427,7 @@
           <p:cNvPr id="3" name="Picture 2">
             <a:extLst>
               <a:ext uri="{FF2B5EF4-FFF2-40B4-BE49-F238E27FC236}">
-                <a16:creationId xmlns:a16="http://schemas.microsoft.com/office/drawing/2014/main" id="{870E8921-F42B-EAD3-F386-F2CF7099AA8F}"/>
+                <a16:creationId xmlns:a16="http://schemas.microsoft.com/office/drawing/2014/main" xmlns="" id="{870E8921-F42B-EAD3-F386-F2CF7099AA8F}"/>
               </a:ext>
             </a:extLst>
           </p:cNvPr>
@@ -4447,7 +4457,7 @@
           <p:cNvPr id="4" name="Grafik 3" descr="Ein Bild, das Text enthält.&#10;&#10;Automatisch generierte Beschreibung">
             <a:extLst>
               <a:ext uri="{FF2B5EF4-FFF2-40B4-BE49-F238E27FC236}">
-                <a16:creationId xmlns:a16="http://schemas.microsoft.com/office/drawing/2014/main" id="{B614220C-52EF-6B79-B8AD-8D481635475F}"/>
+                <a16:creationId xmlns:a16="http://schemas.microsoft.com/office/drawing/2014/main" xmlns="" id="{B614220C-52EF-6B79-B8AD-8D481635475F}"/>
               </a:ext>
             </a:extLst>
           </p:cNvPr>
@@ -4534,7 +4544,7 @@
           <p:cNvPr id="4" name="Grafik 3" descr="Ein Bild, das Text enthält.&#10;&#10;Automatisch generierte Beschreibung">
             <a:extLst>
               <a:ext uri="{FF2B5EF4-FFF2-40B4-BE49-F238E27FC236}">
-                <a16:creationId xmlns:a16="http://schemas.microsoft.com/office/drawing/2014/main" id="{DA1394A2-74A2-5B35-D1BB-C59A27F8460C}"/>
+                <a16:creationId xmlns:a16="http://schemas.microsoft.com/office/drawing/2014/main" xmlns="" id="{DA1394A2-74A2-5B35-D1BB-C59A27F8460C}"/>
               </a:ext>
             </a:extLst>
           </p:cNvPr>
@@ -4626,7 +4636,7 @@
           <p:cNvPr id="7" name="Grafik 6" descr="Ein Bild, das Text enthält.&#10;&#10;Automatisch generierte Beschreibung">
             <a:extLst>
               <a:ext uri="{FF2B5EF4-FFF2-40B4-BE49-F238E27FC236}">
-                <a16:creationId xmlns:a16="http://schemas.microsoft.com/office/drawing/2014/main" id="{D0F1D42C-2DF5-435F-7834-7A82170957F1}"/>
+                <a16:creationId xmlns:a16="http://schemas.microsoft.com/office/drawing/2014/main" xmlns="" id="{D0F1D42C-2DF5-435F-7834-7A82170957F1}"/>
               </a:ext>
             </a:extLst>
           </p:cNvPr>
@@ -4636,7 +4646,7 @@
           <p:nvPr/>
         </p:nvPicPr>
         <p:blipFill>
-          <a:blip r:embed="rId2">
+          <a:blip r:embed="rId2" cstate="print">
             <a:extLst>
               <a:ext uri="{28A0092B-C50C-407E-A947-70E740481C1C}">
                 <a14:useLocalDpi xmlns:a14="http://schemas.microsoft.com/office/drawing/2010/main" val="0"/>
@@ -4662,7 +4672,7 @@
           <p:cNvPr id="9" name="Grafik 8" descr="Ein Bild, das Text enthält.&#10;&#10;Automatisch generierte Beschreibung">
             <a:extLst>
               <a:ext uri="{FF2B5EF4-FFF2-40B4-BE49-F238E27FC236}">
-                <a16:creationId xmlns:a16="http://schemas.microsoft.com/office/drawing/2014/main" id="{08ECD5E4-CCA6-1B34-210E-D4BA245C5F6B}"/>
+                <a16:creationId xmlns:a16="http://schemas.microsoft.com/office/drawing/2014/main" xmlns="" id="{08ECD5E4-CCA6-1B34-210E-D4BA245C5F6B}"/>
               </a:ext>
             </a:extLst>
           </p:cNvPr>
@@ -5027,6 +5037,115 @@
 </p:sld>
 </file>
 
+<file path=ppt/slides/slide29.xml><?xml version="1.0" encoding="utf-8"?>
+<p:sld xmlns:a="http://schemas.openxmlformats.org/drawingml/2006/main" xmlns:r="http://schemas.openxmlformats.org/officeDocument/2006/relationships" xmlns:p="http://schemas.openxmlformats.org/presentationml/2006/main">
+  <p:cSld>
+    <p:spTree>
+      <p:nvGrpSpPr>
+        <p:cNvPr id="1" name=""/>
+        <p:cNvGrpSpPr/>
+        <p:nvPr/>
+      </p:nvGrpSpPr>
+      <p:grpSpPr>
+        <a:xfrm>
+          <a:off x="0" y="0"/>
+          <a:ext cx="0" cy="0"/>
+          <a:chOff x="0" y="0"/>
+          <a:chExt cx="0" cy="0"/>
+        </a:xfrm>
+      </p:grpSpPr>
+      <p:sp>
+        <p:nvSpPr>
+          <p:cNvPr id="3" name="Title 2"/>
+          <p:cNvSpPr>
+            <a:spLocks noGrp="1"/>
+          </p:cNvSpPr>
+          <p:nvPr>
+            <p:ph type="title"/>
+          </p:nvPr>
+        </p:nvSpPr>
+        <p:spPr/>
+        <p:txBody>
+          <a:bodyPr/>
+          <a:lstStyle/>
+          <a:p>
+            <a:r>
+              <a:rPr lang="de-DE" dirty="0"/>
+              <a:t>Präsentation der Code-Dokumentation und Metrik-Auswertung in GitLab</a:t>
+            </a:r>
+            <a:endParaRPr lang="en-GB" dirty="0"/>
+          </a:p>
+        </p:txBody>
+      </p:sp>
+      <p:pic>
+        <p:nvPicPr>
+          <p:cNvPr id="1026" name="Picture 2"/>
+          <p:cNvPicPr>
+            <a:picLocks noGrp="1" noChangeAspect="1" noChangeArrowheads="1"/>
+          </p:cNvPicPr>
+          <p:nvPr>
+            <p:ph idx="1"/>
+          </p:nvPr>
+        </p:nvPicPr>
+        <p:blipFill>
+          <a:blip r:embed="rId2">
+            <a:extLst>
+              <a:ext uri="{28A0092B-C50C-407E-A947-70E740481C1C}">
+                <a14:useLocalDpi xmlns:a14="http://schemas.microsoft.com/office/drawing/2010/main" val="0"/>
+              </a:ext>
+            </a:extLst>
+          </a:blip>
+          <a:srcRect/>
+          <a:stretch>
+            <a:fillRect/>
+          </a:stretch>
+        </p:blipFill>
+        <p:spPr bwMode="auto">
+          <a:xfrm>
+            <a:off x="471488" y="1633364"/>
+            <a:ext cx="8802688" cy="3563121"/>
+          </a:xfrm>
+          <a:prstGeom prst="rect">
+            <a:avLst/>
+          </a:prstGeom>
+          <a:noFill/>
+          <a:ln>
+            <a:noFill/>
+          </a:ln>
+          <a:extLst>
+            <a:ext uri="{909E8E84-426E-40DD-AFC4-6F175D3DCCD1}">
+              <a14:hiddenFill xmlns:a14="http://schemas.microsoft.com/office/drawing/2010/main">
+                <a:solidFill>
+                  <a:schemeClr val="accent1"/>
+                </a:solidFill>
+              </a14:hiddenFill>
+            </a:ext>
+            <a:ext uri="{91240B29-F687-4F45-9708-019B960494DF}">
+              <a14:hiddenLine xmlns:a14="http://schemas.microsoft.com/office/drawing/2010/main" w="9525">
+                <a:solidFill>
+                  <a:schemeClr val="tx1"/>
+                </a:solidFill>
+                <a:miter lim="800000"/>
+                <a:headEnd/>
+                <a:tailEnd/>
+              </a14:hiddenLine>
+            </a:ext>
+          </a:extLst>
+        </p:spPr>
+      </p:pic>
+    </p:spTree>
+    <p:extLst>
+      <p:ext uri="{BB962C8B-B14F-4D97-AF65-F5344CB8AC3E}">
+        <p14:creationId xmlns:p14="http://schemas.microsoft.com/office/powerpoint/2010/main" val="4074349105"/>
+      </p:ext>
+    </p:extLst>
+  </p:cSld>
+  <p:clrMapOvr>
+    <a:masterClrMapping/>
+  </p:clrMapOvr>
+</p:sld>
+</file>
+
 <file path=ppt/slides/slide3.xml><?xml version="1.0" encoding="utf-8"?>
 <p:sld xmlns:a="http://schemas.openxmlformats.org/drawingml/2006/main" xmlns:r="http://schemas.openxmlformats.org/officeDocument/2006/relationships" xmlns:p="http://schemas.openxmlformats.org/presentationml/2006/main" showMasterPhAnim="0">
   <p:cSld>
@@ -5106,7 +5225,7 @@
           <p:cNvPr id="3" name="Picture 2">
             <a:extLst>
               <a:ext uri="{FF2B5EF4-FFF2-40B4-BE49-F238E27FC236}">
-                <a16:creationId xmlns:a16="http://schemas.microsoft.com/office/drawing/2014/main" id="{A237FE9B-C399-07EB-588D-BB8002A00213}"/>
+                <a16:creationId xmlns:a16="http://schemas.microsoft.com/office/drawing/2014/main" xmlns="" id="{A237FE9B-C399-07EB-588D-BB8002A00213}"/>
               </a:ext>
             </a:extLst>
           </p:cNvPr>
@@ -5224,7 +5343,7 @@
           <p:cNvPr id="6" name="Picture 5">
             <a:extLst>
               <a:ext uri="{FF2B5EF4-FFF2-40B4-BE49-F238E27FC236}">
-                <a16:creationId xmlns:a16="http://schemas.microsoft.com/office/drawing/2014/main" id="{238F8C43-3611-4A62-B419-7523CFCC7FA9}"/>
+                <a16:creationId xmlns:a16="http://schemas.microsoft.com/office/drawing/2014/main" xmlns="" id="{238F8C43-3611-4A62-B419-7523CFCC7FA9}"/>
               </a:ext>
             </a:extLst>
           </p:cNvPr>
@@ -6407,7 +6526,7 @@
   <a:extraClrSchemeLst/>
   <a:extLst>
     <a:ext uri="{05A4C25C-085E-4340-85A3-A5531E510DB2}">
-      <thm15:themeFamily xmlns:thm15="http://schemas.microsoft.com/office/thememl/2012/main" name="Office Theme 2013 - 2022" id="{62F939B6-93AF-4DB8-9C6B-D6C7DFDC589F}" vid="{4A3C46E8-61CC-4603-A589-7422A47A8E4A}"/>
+      <thm15:themeFamily xmlns:thm15="http://schemas.microsoft.com/office/thememl/2012/main" xmlns="" name="Office Theme 2013 - 2022" id="{62F939B6-93AF-4DB8-9C6B-D6C7DFDC589F}" vid="{4A3C46E8-61CC-4603-A589-7422A47A8E4A}"/>
     </a:ext>
   </a:extLst>
 </a:theme>

</xml_diff>

<commit_message>
fix user stories akzeptanzkriterium
</commit_message>
<xml_diff>
--- a/prototype/Praesentation_Vorlage_OOP_2023_2_OOP.pptx
+++ b/prototype/Praesentation_Vorlage_OOP_2023_2_OOP.pptx
@@ -137,7 +137,7 @@
   </p:defaultTextStyle>
   <p:extLst>
     <p:ext uri="{EFAFB233-063F-42B5-8137-9DF3F51BA10A}">
-      <p15:sldGuideLst xmlns:p15="http://schemas.microsoft.com/office/powerpoint/2012/main" xmlns="">
+      <p15:sldGuideLst xmlns:p15="http://schemas.microsoft.com/office/powerpoint/2012/main">
         <p15:guide id="1" orient="horz" pos="2160">
           <p15:clr>
             <a:srgbClr val="A4A3A4"/>
@@ -151,7 +151,7 @@
       </p15:sldGuideLst>
     </p:ext>
     <p:ext uri="{2D200454-40CA-4A62-9FC3-DE9A4176ACB9}">
-      <p15:notesGuideLst xmlns:p15="http://schemas.microsoft.com/office/powerpoint/2012/main" xmlns=""/>
+      <p15:notesGuideLst xmlns:p15="http://schemas.microsoft.com/office/powerpoint/2012/main"/>
     </p:ext>
   </p:extLst>
 </p:presentation>
@@ -167,6 +167,45 @@
 
 <file path=ppt/changesInfos/changesInfo1.xml><?xml version="1.0" encoding="utf-8"?>
 <pc:chgInfo xmlns:a="http://schemas.openxmlformats.org/drawingml/2006/main" xmlns:r="http://schemas.openxmlformats.org/officeDocument/2006/relationships" xmlns:ac="http://schemas.microsoft.com/office/drawing/2013/main/command" xmlns:pc="http://schemas.microsoft.com/office/powerpoint/2013/main/command">
+  <pc:docChgLst>
+    <pc:chgData name="Silvia Wen" userId="fa3c34b288dc686c" providerId="LiveId" clId="{B2C551B1-8328-47D2-B0E2-7614C02D7124}"/>
+    <pc:docChg chg="modSld">
+      <pc:chgData name="Silvia Wen" userId="fa3c34b288dc686c" providerId="LiveId" clId="{B2C551B1-8328-47D2-B0E2-7614C02D7124}" dt="2023-02-08T23:48:09.038" v="1" actId="20577"/>
+      <pc:docMkLst>
+        <pc:docMk/>
+      </pc:docMkLst>
+      <pc:sldChg chg="modSp mod">
+        <pc:chgData name="Silvia Wen" userId="fa3c34b288dc686c" providerId="LiveId" clId="{B2C551B1-8328-47D2-B0E2-7614C02D7124}" dt="2023-02-08T23:41:11.901" v="0" actId="20577"/>
+        <pc:sldMkLst>
+          <pc:docMk/>
+          <pc:sldMk cId="66586003" sldId="285"/>
+        </pc:sldMkLst>
+        <pc:spChg chg="mod">
+          <ac:chgData name="Silvia Wen" userId="fa3c34b288dc686c" providerId="LiveId" clId="{B2C551B1-8328-47D2-B0E2-7614C02D7124}" dt="2023-02-08T23:41:11.901" v="0" actId="20577"/>
+          <ac:spMkLst>
+            <pc:docMk/>
+            <pc:sldMk cId="66586003" sldId="285"/>
+            <ac:spMk id="5" creationId="{00000000-0000-0000-0000-000000000000}"/>
+          </ac:spMkLst>
+        </pc:spChg>
+      </pc:sldChg>
+      <pc:sldChg chg="modSp mod">
+        <pc:chgData name="Silvia Wen" userId="fa3c34b288dc686c" providerId="LiveId" clId="{B2C551B1-8328-47D2-B0E2-7614C02D7124}" dt="2023-02-08T23:48:09.038" v="1" actId="20577"/>
+        <pc:sldMkLst>
+          <pc:docMk/>
+          <pc:sldMk cId="619945716" sldId="286"/>
+        </pc:sldMkLst>
+        <pc:spChg chg="mod">
+          <ac:chgData name="Silvia Wen" userId="fa3c34b288dc686c" providerId="LiveId" clId="{B2C551B1-8328-47D2-B0E2-7614C02D7124}" dt="2023-02-08T23:48:09.038" v="1" actId="20577"/>
+          <ac:spMkLst>
+            <pc:docMk/>
+            <pc:sldMk cId="619945716" sldId="286"/>
+            <ac:spMk id="5" creationId="{00000000-0000-0000-0000-000000000000}"/>
+          </ac:spMkLst>
+        </pc:spChg>
+      </pc:sldChg>
+    </pc:docChg>
+  </pc:docChgLst>
   <pc:docChgLst>
     <pc:chgData name="Silvia Wen" userId="fa3c34b288dc686c" providerId="LiveId" clId="{1089C391-FFDE-4EC2-B73C-58CF154F0003}"/>
     <pc:docChg chg="custSel addSld delSld modSld sldOrd">
@@ -446,7 +485,7 @@
           <a:p>
             <a:fld id="{A923DEBB-A8B7-4651-B065-888F326E9B5F}" type="datetimeFigureOut">
               <a:rPr lang="en-ID" smtClean="0"/>
-              <a:t>08/02/2023</a:t>
+              <a:t>09/02/2023</a:t>
             </a:fld>
             <a:endParaRPr lang="en-ID"/>
           </a:p>
@@ -605,7 +644,7 @@
           <a:p>
             <a:fld id="{4C7363D8-BE64-4D75-837D-10AB2CA52B9B}" type="slidenum">
               <a:rPr lang="en-ID" smtClean="0"/>
-              <a:t>‹#›</a:t>
+              <a:t>‹Nr.›</a:t>
             </a:fld>
             <a:endParaRPr lang="en-ID"/>
           </a:p>
@@ -864,7 +903,7 @@
             </a:pPr>
             <a:fld id="{911D8C60-1F2D-4436-BF53-22882F494404}" type="datetimeFigureOut">
               <a:rPr lang="de-DE"/>
-              <a:t>08.02.2023</a:t>
+              <a:t>09.02.2023</a:t>
             </a:fld>
             <a:endParaRPr lang="de-DE"/>
           </a:p>
@@ -936,7 +975,7 @@
             </a:pPr>
             <a:fld id="{83B23FF1-3F66-4904-91CE-1AE4A5050627}" type="slidenum">
               <a:rPr lang="de-DE"/>
-              <a:t>‹#›</a:t>
+              <a:t>‹Nr.›</a:t>
             </a:fld>
             <a:endParaRPr lang="de-DE"/>
           </a:p>
@@ -1379,7 +1418,7 @@
                   <a:srgbClr val="808080"/>
                 </a:solidFill>
               </a:rPr>
-              <a:t>‹#›</a:t>
+              <a:t>‹Nr.›</a:t>
             </a:fld>
             <a:endParaRPr lang="de-DE" sz="1100">
               <a:solidFill>
@@ -2115,7 +2154,7 @@
           <p:cNvPr id="7" name="Straight Connector 6">
             <a:extLst>
               <a:ext uri="{FF2B5EF4-FFF2-40B4-BE49-F238E27FC236}">
-                <a16:creationId xmlns:a16="http://schemas.microsoft.com/office/drawing/2014/main" xmlns="" id="{26317280-AFFA-15C9-E277-5437F436DDD4}"/>
+                <a16:creationId xmlns:a16="http://schemas.microsoft.com/office/drawing/2014/main" id="{26317280-AFFA-15C9-E277-5437F436DDD4}"/>
               </a:ext>
             </a:extLst>
           </p:cNvPr>
@@ -2185,7 +2224,7 @@
           <p:cNvPr id="9" name="Picture 2" descr="Diebold Nixdorf inks a deal with bank99 for ATM network management">
             <a:extLst>
               <a:ext uri="{FF2B5EF4-FFF2-40B4-BE49-F238E27FC236}">
-                <a16:creationId xmlns:a16="http://schemas.microsoft.com/office/drawing/2014/main" xmlns="" id="{CAD2B3CE-B5E3-8F93-6B29-6703CE07C7BD}"/>
+                <a16:creationId xmlns:a16="http://schemas.microsoft.com/office/drawing/2014/main" id="{CAD2B3CE-B5E3-8F93-6B29-6703CE07C7BD}"/>
               </a:ext>
             </a:extLst>
           </p:cNvPr>
@@ -2283,7 +2322,7 @@
           <p:cNvPr id="13" name="TextBox 12">
             <a:extLst>
               <a:ext uri="{FF2B5EF4-FFF2-40B4-BE49-F238E27FC236}">
-                <a16:creationId xmlns:a16="http://schemas.microsoft.com/office/drawing/2014/main" xmlns="" id="{C5EF9B15-FA07-E32F-7F4D-34F8A046AE0C}"/>
+                <a16:creationId xmlns:a16="http://schemas.microsoft.com/office/drawing/2014/main" id="{C5EF9B15-FA07-E32F-7F4D-34F8A046AE0C}"/>
               </a:ext>
             </a:extLst>
           </p:cNvPr>
@@ -2319,7 +2358,7 @@
           <p:cNvPr id="21" name="Graphic 20" descr="User">
             <a:extLst>
               <a:ext uri="{FF2B5EF4-FFF2-40B4-BE49-F238E27FC236}">
-                <a16:creationId xmlns:a16="http://schemas.microsoft.com/office/drawing/2014/main" xmlns="" id="{966ED70C-983D-CACD-04DF-A7710305E8E3}"/>
+                <a16:creationId xmlns:a16="http://schemas.microsoft.com/office/drawing/2014/main" id="{966ED70C-983D-CACD-04DF-A7710305E8E3}"/>
               </a:ext>
             </a:extLst>
           </p:cNvPr>
@@ -2335,7 +2374,7 @@
                 <a14:useLocalDpi xmlns:a14="http://schemas.microsoft.com/office/drawing/2010/main" val="0"/>
               </a:ext>
               <a:ext uri="{96DAC541-7B7A-43D3-8B79-37D633B846F1}">
-                <asvg:svgBlip xmlns:asvg="http://schemas.microsoft.com/office/drawing/2016/SVG/main" xmlns="" r:embed="rId5"/>
+                <asvg:svgBlip xmlns:asvg="http://schemas.microsoft.com/office/drawing/2016/SVG/main" r:embed="rId5"/>
               </a:ext>
             </a:extLst>
           </a:blip>
@@ -2358,7 +2397,7 @@
           <p:cNvPr id="24" name="TextBox 23">
             <a:extLst>
               <a:ext uri="{FF2B5EF4-FFF2-40B4-BE49-F238E27FC236}">
-                <a16:creationId xmlns:a16="http://schemas.microsoft.com/office/drawing/2014/main" xmlns="" id="{4A12341E-82B0-5B47-CA9F-9390CE970E41}"/>
+                <a16:creationId xmlns:a16="http://schemas.microsoft.com/office/drawing/2014/main" id="{4A12341E-82B0-5B47-CA9F-9390CE970E41}"/>
               </a:ext>
             </a:extLst>
           </p:cNvPr>
@@ -2394,7 +2433,7 @@
           <p:cNvPr id="27" name="Straight Connector 26">
             <a:extLst>
               <a:ext uri="{FF2B5EF4-FFF2-40B4-BE49-F238E27FC236}">
-                <a16:creationId xmlns:a16="http://schemas.microsoft.com/office/drawing/2014/main" xmlns="" id="{6B752903-6222-6110-A2CA-693C8C006B99}"/>
+                <a16:creationId xmlns:a16="http://schemas.microsoft.com/office/drawing/2014/main" id="{6B752903-6222-6110-A2CA-693C8C006B99}"/>
               </a:ext>
             </a:extLst>
           </p:cNvPr>
@@ -2433,7 +2472,7 @@
           <p:cNvPr id="2" name="TextBox 1">
             <a:extLst>
               <a:ext uri="{FF2B5EF4-FFF2-40B4-BE49-F238E27FC236}">
-                <a16:creationId xmlns:a16="http://schemas.microsoft.com/office/drawing/2014/main" xmlns="" id="{82CD9FC1-02A8-8A5A-09A7-6D93AF4BE01F}"/>
+                <a16:creationId xmlns:a16="http://schemas.microsoft.com/office/drawing/2014/main" id="{82CD9FC1-02A8-8A5A-09A7-6D93AF4BE01F}"/>
               </a:ext>
             </a:extLst>
           </p:cNvPr>
@@ -2525,7 +2564,7 @@
           <p:cNvPr id="3" name="Grafik 2">
             <a:extLst>
               <a:ext uri="{FF2B5EF4-FFF2-40B4-BE49-F238E27FC236}">
-                <a16:creationId xmlns:a16="http://schemas.microsoft.com/office/drawing/2014/main" xmlns="" id="{8475CA77-0231-736E-F08F-31E38A973EAA}"/>
+                <a16:creationId xmlns:a16="http://schemas.microsoft.com/office/drawing/2014/main" id="{8475CA77-0231-736E-F08F-31E38A973EAA}"/>
               </a:ext>
             </a:extLst>
           </p:cNvPr>
@@ -2644,7 +2683,7 @@
           <p:cNvPr id="3" name="Picture 2">
             <a:extLst>
               <a:ext uri="{FF2B5EF4-FFF2-40B4-BE49-F238E27FC236}">
-                <a16:creationId xmlns:a16="http://schemas.microsoft.com/office/drawing/2014/main" xmlns="" id="{A2277A1D-FE6E-61AC-FCE4-32E1BE5224FE}"/>
+                <a16:creationId xmlns:a16="http://schemas.microsoft.com/office/drawing/2014/main" id="{A2277A1D-FE6E-61AC-FCE4-32E1BE5224FE}"/>
               </a:ext>
             </a:extLst>
           </p:cNvPr>
@@ -2731,7 +2770,7 @@
           <p:cNvPr id="6" name="Inhaltsplatzhalter 5">
             <a:extLst>
               <a:ext uri="{FF2B5EF4-FFF2-40B4-BE49-F238E27FC236}">
-                <a16:creationId xmlns:a16="http://schemas.microsoft.com/office/drawing/2014/main" xmlns="" id="{20A3C10B-BE22-4BB4-1975-7E785A4229B5}"/>
+                <a16:creationId xmlns:a16="http://schemas.microsoft.com/office/drawing/2014/main" id="{20A3C10B-BE22-4BB4-1975-7E785A4229B5}"/>
               </a:ext>
             </a:extLst>
           </p:cNvPr>
@@ -2766,7 +2805,7 @@
           <p:cNvPr id="2" name="Picture 2">
             <a:extLst>
               <a:ext uri="{FF2B5EF4-FFF2-40B4-BE49-F238E27FC236}">
-                <a16:creationId xmlns:a16="http://schemas.microsoft.com/office/drawing/2014/main" xmlns="" id="{02F275F0-6419-2996-FE33-7AE0CF3920B4}"/>
+                <a16:creationId xmlns:a16="http://schemas.microsoft.com/office/drawing/2014/main" id="{02F275F0-6419-2996-FE33-7AE0CF3920B4}"/>
               </a:ext>
             </a:extLst>
           </p:cNvPr>
@@ -2802,7 +2841,7 @@
           <p:cNvPr id="5" name="Gerade Verbindung mit Pfeil 4">
             <a:extLst>
               <a:ext uri="{FF2B5EF4-FFF2-40B4-BE49-F238E27FC236}">
-                <a16:creationId xmlns:a16="http://schemas.microsoft.com/office/drawing/2014/main" xmlns="" id="{A902F25D-EA25-8C19-851D-CAC2FE941C19}"/>
+                <a16:creationId xmlns:a16="http://schemas.microsoft.com/office/drawing/2014/main" id="{A902F25D-EA25-8C19-851D-CAC2FE941C19}"/>
               </a:ext>
             </a:extLst>
           </p:cNvPr>
@@ -2843,7 +2882,7 @@
           <p:cNvPr id="8" name="Gerade Verbindung mit Pfeil 7">
             <a:extLst>
               <a:ext uri="{FF2B5EF4-FFF2-40B4-BE49-F238E27FC236}">
-                <a16:creationId xmlns:a16="http://schemas.microsoft.com/office/drawing/2014/main" xmlns="" id="{70CA491C-E035-D9D4-7179-1643CD61DF8E}"/>
+                <a16:creationId xmlns:a16="http://schemas.microsoft.com/office/drawing/2014/main" id="{70CA491C-E035-D9D4-7179-1643CD61DF8E}"/>
               </a:ext>
             </a:extLst>
           </p:cNvPr>
@@ -2884,7 +2923,7 @@
           <p:cNvPr id="9" name="Verbinder: gewinkelt 8">
             <a:extLst>
               <a:ext uri="{FF2B5EF4-FFF2-40B4-BE49-F238E27FC236}">
-                <a16:creationId xmlns:a16="http://schemas.microsoft.com/office/drawing/2014/main" xmlns="" id="{5FC0E4E4-676C-37C0-EE26-69403D31F132}"/>
+                <a16:creationId xmlns:a16="http://schemas.microsoft.com/office/drawing/2014/main" id="{5FC0E4E4-676C-37C0-EE26-69403D31F132}"/>
               </a:ext>
             </a:extLst>
           </p:cNvPr>
@@ -2927,7 +2966,7 @@
           <p:cNvPr id="21" name="Verbinder: gewinkelt 20">
             <a:extLst>
               <a:ext uri="{FF2B5EF4-FFF2-40B4-BE49-F238E27FC236}">
-                <a16:creationId xmlns:a16="http://schemas.microsoft.com/office/drawing/2014/main" xmlns="" id="{1CD258BB-31E6-3467-A612-E64178620882}"/>
+                <a16:creationId xmlns:a16="http://schemas.microsoft.com/office/drawing/2014/main" id="{1CD258BB-31E6-3467-A612-E64178620882}"/>
               </a:ext>
             </a:extLst>
           </p:cNvPr>
@@ -3028,7 +3067,7 @@
           <p:cNvPr id="6" name="Content Placeholder 5">
             <a:extLst>
               <a:ext uri="{FF2B5EF4-FFF2-40B4-BE49-F238E27FC236}">
-                <a16:creationId xmlns:a16="http://schemas.microsoft.com/office/drawing/2014/main" xmlns="" id="{36222083-9675-1777-F9ED-89997080D102}"/>
+                <a16:creationId xmlns:a16="http://schemas.microsoft.com/office/drawing/2014/main" id="{36222083-9675-1777-F9ED-89997080D102}"/>
               </a:ext>
             </a:extLst>
           </p:cNvPr>
@@ -3121,7 +3160,7 @@
           <p:cNvPr id="5" name="Picture 4">
             <a:extLst>
               <a:ext uri="{FF2B5EF4-FFF2-40B4-BE49-F238E27FC236}">
-                <a16:creationId xmlns:a16="http://schemas.microsoft.com/office/drawing/2014/main" xmlns="" id="{6186830C-A930-1F01-8695-30CF8FCB2EBF}"/>
+                <a16:creationId xmlns:a16="http://schemas.microsoft.com/office/drawing/2014/main" id="{6186830C-A930-1F01-8695-30CF8FCB2EBF}"/>
               </a:ext>
             </a:extLst>
           </p:cNvPr>
@@ -3215,7 +3254,7 @@
           <p:cNvPr id="4" name="Grafik 3">
             <a:extLst>
               <a:ext uri="{FF2B5EF4-FFF2-40B4-BE49-F238E27FC236}">
-                <a16:creationId xmlns:a16="http://schemas.microsoft.com/office/drawing/2014/main" xmlns="" id="{363B3C03-C452-3B13-55D2-BC8080278200}"/>
+                <a16:creationId xmlns:a16="http://schemas.microsoft.com/office/drawing/2014/main" id="{363B3C03-C452-3B13-55D2-BC8080278200}"/>
               </a:ext>
             </a:extLst>
           </p:cNvPr>
@@ -3308,7 +3347,7 @@
           <p:cNvPr id="5" name="Picture 4">
             <a:extLst>
               <a:ext uri="{FF2B5EF4-FFF2-40B4-BE49-F238E27FC236}">
-                <a16:creationId xmlns:a16="http://schemas.microsoft.com/office/drawing/2014/main" xmlns="" id="{081731FC-25FD-129F-1B98-4BC272BD7B87}"/>
+                <a16:creationId xmlns:a16="http://schemas.microsoft.com/office/drawing/2014/main" id="{081731FC-25FD-129F-1B98-4BC272BD7B87}"/>
               </a:ext>
             </a:extLst>
           </p:cNvPr>
@@ -3399,7 +3438,7 @@
           <p:cNvPr id="6" name="Content Placeholder 5">
             <a:extLst>
               <a:ext uri="{FF2B5EF4-FFF2-40B4-BE49-F238E27FC236}">
-                <a16:creationId xmlns:a16="http://schemas.microsoft.com/office/drawing/2014/main" xmlns="" id="{6ED74517-3346-2B74-1BD8-2D8548C5ACE2}"/>
+                <a16:creationId xmlns:a16="http://schemas.microsoft.com/office/drawing/2014/main" id="{6ED74517-3346-2B74-1BD8-2D8548C5ACE2}"/>
               </a:ext>
             </a:extLst>
           </p:cNvPr>
@@ -3424,7 +3463,7 @@
           <p:cNvPr id="4" name="Picture 3">
             <a:extLst>
               <a:ext uri="{FF2B5EF4-FFF2-40B4-BE49-F238E27FC236}">
-                <a16:creationId xmlns:a16="http://schemas.microsoft.com/office/drawing/2014/main" xmlns="" id="{46F4067B-667B-547F-D672-5248954D0B83}"/>
+                <a16:creationId xmlns:a16="http://schemas.microsoft.com/office/drawing/2014/main" id="{46F4067B-667B-547F-D672-5248954D0B83}"/>
               </a:ext>
             </a:extLst>
           </p:cNvPr>
@@ -3823,15 +3862,6 @@
               <a:rPr lang="de-DE" dirty="0"/>
               <a:t>Anforderungstext – Bank</a:t>
             </a:r>
-            <a:r>
-              <a:rPr lang="de-DE" sz="2400" b="0" i="0" u="none" strike="noStrike" baseline="0" dirty="0">
-                <a:solidFill>
-                  <a:srgbClr val="4471C4"/>
-                </a:solidFill>
-                <a:latin typeface="Calibri" panose="020F0502020204030204" pitchFamily="34" charset="0"/>
-              </a:rPr>
-              <a:t/>
-            </a:r>
             <a:br>
               <a:rPr lang="de-DE" sz="2400" b="0" i="0" u="none" strike="noStrike" baseline="0" dirty="0">
                 <a:solidFill>
@@ -3975,7 +4005,7 @@
           <p:cNvPr id="4" name="Content Placeholder 3">
             <a:extLst>
               <a:ext uri="{FF2B5EF4-FFF2-40B4-BE49-F238E27FC236}">
-                <a16:creationId xmlns:a16="http://schemas.microsoft.com/office/drawing/2014/main" xmlns="" id="{9010E731-AA66-216E-5B70-E652E690C102}"/>
+                <a16:creationId xmlns:a16="http://schemas.microsoft.com/office/drawing/2014/main" id="{9010E731-AA66-216E-5B70-E652E690C102}"/>
               </a:ext>
             </a:extLst>
           </p:cNvPr>
@@ -4000,7 +4030,7 @@
           <p:cNvPr id="5" name="Picture 4">
             <a:extLst>
               <a:ext uri="{FF2B5EF4-FFF2-40B4-BE49-F238E27FC236}">
-                <a16:creationId xmlns:a16="http://schemas.microsoft.com/office/drawing/2014/main" xmlns="" id="{4FEDF282-BF85-630B-664A-2F15AA8C1B80}"/>
+                <a16:creationId xmlns:a16="http://schemas.microsoft.com/office/drawing/2014/main" id="{4FEDF282-BF85-630B-664A-2F15AA8C1B80}"/>
               </a:ext>
             </a:extLst>
           </p:cNvPr>
@@ -4245,7 +4275,7 @@
           <p:cNvPr id="4" name="Content Placeholder 3">
             <a:extLst>
               <a:ext uri="{FF2B5EF4-FFF2-40B4-BE49-F238E27FC236}">
-                <a16:creationId xmlns:a16="http://schemas.microsoft.com/office/drawing/2014/main" xmlns="" id="{1FF17E53-26A6-C999-F48F-D49E91B13BF6}"/>
+                <a16:creationId xmlns:a16="http://schemas.microsoft.com/office/drawing/2014/main" id="{1FF17E53-26A6-C999-F48F-D49E91B13BF6}"/>
               </a:ext>
             </a:extLst>
           </p:cNvPr>
@@ -4302,7 +4332,7 @@
           <p:cNvPr id="6" name="Picture 5">
             <a:extLst>
               <a:ext uri="{FF2B5EF4-FFF2-40B4-BE49-F238E27FC236}">
-                <a16:creationId xmlns:a16="http://schemas.microsoft.com/office/drawing/2014/main" xmlns="" id="{75E006CF-B38C-4D78-A308-61062552E542}"/>
+                <a16:creationId xmlns:a16="http://schemas.microsoft.com/office/drawing/2014/main" id="{75E006CF-B38C-4D78-A308-61062552E542}"/>
               </a:ext>
             </a:extLst>
           </p:cNvPr>
@@ -4427,7 +4457,7 @@
           <p:cNvPr id="3" name="Picture 2">
             <a:extLst>
               <a:ext uri="{FF2B5EF4-FFF2-40B4-BE49-F238E27FC236}">
-                <a16:creationId xmlns:a16="http://schemas.microsoft.com/office/drawing/2014/main" xmlns="" id="{870E8921-F42B-EAD3-F386-F2CF7099AA8F}"/>
+                <a16:creationId xmlns:a16="http://schemas.microsoft.com/office/drawing/2014/main" id="{870E8921-F42B-EAD3-F386-F2CF7099AA8F}"/>
               </a:ext>
             </a:extLst>
           </p:cNvPr>
@@ -4457,7 +4487,7 @@
           <p:cNvPr id="4" name="Grafik 3" descr="Ein Bild, das Text enthält.&#10;&#10;Automatisch generierte Beschreibung">
             <a:extLst>
               <a:ext uri="{FF2B5EF4-FFF2-40B4-BE49-F238E27FC236}">
-                <a16:creationId xmlns:a16="http://schemas.microsoft.com/office/drawing/2014/main" xmlns="" id="{B614220C-52EF-6B79-B8AD-8D481635475F}"/>
+                <a16:creationId xmlns:a16="http://schemas.microsoft.com/office/drawing/2014/main" id="{B614220C-52EF-6B79-B8AD-8D481635475F}"/>
               </a:ext>
             </a:extLst>
           </p:cNvPr>
@@ -4544,7 +4574,7 @@
           <p:cNvPr id="4" name="Grafik 3" descr="Ein Bild, das Text enthält.&#10;&#10;Automatisch generierte Beschreibung">
             <a:extLst>
               <a:ext uri="{FF2B5EF4-FFF2-40B4-BE49-F238E27FC236}">
-                <a16:creationId xmlns:a16="http://schemas.microsoft.com/office/drawing/2014/main" xmlns="" id="{DA1394A2-74A2-5B35-D1BB-C59A27F8460C}"/>
+                <a16:creationId xmlns:a16="http://schemas.microsoft.com/office/drawing/2014/main" id="{DA1394A2-74A2-5B35-D1BB-C59A27F8460C}"/>
               </a:ext>
             </a:extLst>
           </p:cNvPr>
@@ -4636,7 +4666,7 @@
           <p:cNvPr id="7" name="Grafik 6" descr="Ein Bild, das Text enthält.&#10;&#10;Automatisch generierte Beschreibung">
             <a:extLst>
               <a:ext uri="{FF2B5EF4-FFF2-40B4-BE49-F238E27FC236}">
-                <a16:creationId xmlns:a16="http://schemas.microsoft.com/office/drawing/2014/main" xmlns="" id="{D0F1D42C-2DF5-435F-7834-7A82170957F1}"/>
+                <a16:creationId xmlns:a16="http://schemas.microsoft.com/office/drawing/2014/main" id="{D0F1D42C-2DF5-435F-7834-7A82170957F1}"/>
               </a:ext>
             </a:extLst>
           </p:cNvPr>
@@ -4672,7 +4702,7 @@
           <p:cNvPr id="9" name="Grafik 8" descr="Ein Bild, das Text enthält.&#10;&#10;Automatisch generierte Beschreibung">
             <a:extLst>
               <a:ext uri="{FF2B5EF4-FFF2-40B4-BE49-F238E27FC236}">
-                <a16:creationId xmlns:a16="http://schemas.microsoft.com/office/drawing/2014/main" xmlns="" id="{08ECD5E4-CCA6-1B34-210E-D4BA245C5F6B}"/>
+                <a16:creationId xmlns:a16="http://schemas.microsoft.com/office/drawing/2014/main" id="{08ECD5E4-CCA6-1B34-210E-D4BA245C5F6B}"/>
               </a:ext>
             </a:extLst>
           </p:cNvPr>
@@ -5225,7 +5255,7 @@
           <p:cNvPr id="3" name="Picture 2">
             <a:extLst>
               <a:ext uri="{FF2B5EF4-FFF2-40B4-BE49-F238E27FC236}">
-                <a16:creationId xmlns:a16="http://schemas.microsoft.com/office/drawing/2014/main" xmlns="" id="{A237FE9B-C399-07EB-588D-BB8002A00213}"/>
+                <a16:creationId xmlns:a16="http://schemas.microsoft.com/office/drawing/2014/main" id="{A237FE9B-C399-07EB-588D-BB8002A00213}"/>
               </a:ext>
             </a:extLst>
           </p:cNvPr>
@@ -5343,7 +5373,7 @@
           <p:cNvPr id="6" name="Picture 5">
             <a:extLst>
               <a:ext uri="{FF2B5EF4-FFF2-40B4-BE49-F238E27FC236}">
-                <a16:creationId xmlns:a16="http://schemas.microsoft.com/office/drawing/2014/main" xmlns="" id="{238F8C43-3611-4A62-B419-7523CFCC7FA9}"/>
+                <a16:creationId xmlns:a16="http://schemas.microsoft.com/office/drawing/2014/main" id="{238F8C43-3611-4A62-B419-7523CFCC7FA9}"/>
               </a:ext>
             </a:extLst>
           </p:cNvPr>
@@ -5615,15 +5645,6 @@
               <a:t>Der Kunde muss seine Name und Adresse eingeben.</a:t>
             </a:r>
           </a:p>
-          <a:p>
-            <a:pPr>
-              <a:defRPr/>
-            </a:pPr>
-            <a:r>
-              <a:rPr lang="de-DE" dirty="0"/>
-              <a:t>Die eingegebene Name und Adresse muss zum Personalausweis übereinstimmen.</a:t>
-            </a:r>
-          </a:p>
         </p:txBody>
       </p:sp>
       <p:sp>
@@ -5745,17 +5766,12 @@
               <a:defRPr/>
             </a:pPr>
             <a:r>
+              <a:rPr lang="de-DE"/>
+              <a:t>Das </a:t>
+            </a:r>
+            <a:r>
               <a:rPr lang="de-DE" dirty="0"/>
-              <a:t>Der Kunde muss zweimal das Password eingeben.</a:t>
-            </a:r>
-          </a:p>
-          <a:p>
-            <a:pPr>
-              <a:defRPr/>
-            </a:pPr>
-            <a:r>
-              <a:rPr lang="de-DE" dirty="0"/>
-              <a:t>Das Password muss aus mindestens 9 Zeichen bestehen.</a:t>
+              <a:t>Password muss aus mindestens 9 Zeichen bestehen.</a:t>
             </a:r>
           </a:p>
         </p:txBody>
@@ -6526,7 +6542,7 @@
   <a:extraClrSchemeLst/>
   <a:extLst>
     <a:ext uri="{05A4C25C-085E-4340-85A3-A5531E510DB2}">
-      <thm15:themeFamily xmlns:thm15="http://schemas.microsoft.com/office/thememl/2012/main" xmlns="" name="Office Theme 2013 - 2022" id="{62F939B6-93AF-4DB8-9C6B-D6C7DFDC589F}" vid="{4A3C46E8-61CC-4603-A589-7422A47A8E4A}"/>
+      <thm15:themeFamily xmlns:thm15="http://schemas.microsoft.com/office/thememl/2012/main" name="Office Theme 2013 - 2022" id="{62F939B6-93AF-4DB8-9C6B-D6C7DFDC589F}" vid="{4A3C46E8-61CC-4603-A589-7422A47A8E4A}"/>
     </a:ext>
   </a:extLst>
 </a:theme>

</xml_diff>

<commit_message>
final presentation w/o updates in component diagram
</commit_message>
<xml_diff>
--- a/prototype/Praesentation_Vorlage_OOP_2023_2_OOP.pptx
+++ b/prototype/Praesentation_Vorlage_OOP_2023_2_OOP.pptx
@@ -161,6 +161,7 @@
 <p1510:revInfo xmlns:a="http://schemas.openxmlformats.org/drawingml/2006/main" xmlns:r="http://schemas.openxmlformats.org/officeDocument/2006/relationships" xmlns:p1510="http://schemas.microsoft.com/office/powerpoint/2015/10/main">
   <p1510:revLst>
     <p1510:client id="{1089C391-FFDE-4EC2-B73C-58CF154F0003}" v="10" dt="2023-02-08T21:24:40.763"/>
+    <p1510:client id="{B2C551B1-8328-47D2-B0E2-7614C02D7124}" v="1" dt="2023-02-09T15:28:48.167"/>
   </p1510:revLst>
 </p1510:revInfo>
 </file>
@@ -169,8 +170,8 @@
 <pc:chgInfo xmlns:a="http://schemas.openxmlformats.org/drawingml/2006/main" xmlns:r="http://schemas.openxmlformats.org/officeDocument/2006/relationships" xmlns:ac="http://schemas.microsoft.com/office/drawing/2013/main/command" xmlns:pc="http://schemas.microsoft.com/office/powerpoint/2013/main/command">
   <pc:docChgLst>
     <pc:chgData name="Silvia Wen" userId="fa3c34b288dc686c" providerId="LiveId" clId="{B2C551B1-8328-47D2-B0E2-7614C02D7124}"/>
-    <pc:docChg chg="modSld">
-      <pc:chgData name="Silvia Wen" userId="fa3c34b288dc686c" providerId="LiveId" clId="{B2C551B1-8328-47D2-B0E2-7614C02D7124}" dt="2023-02-08T23:48:09.038" v="1" actId="20577"/>
+    <pc:docChg chg="custSel modSld">
+      <pc:chgData name="Silvia Wen" userId="fa3c34b288dc686c" providerId="LiveId" clId="{B2C551B1-8328-47D2-B0E2-7614C02D7124}" dt="2023-02-09T15:29:28.477" v="13" actId="1076"/>
       <pc:docMkLst>
         <pc:docMk/>
       </pc:docMkLst>
@@ -203,6 +204,37 @@
             <ac:spMk id="5" creationId="{00000000-0000-0000-0000-000000000000}"/>
           </ac:spMkLst>
         </pc:spChg>
+      </pc:sldChg>
+      <pc:sldChg chg="addSp delSp modSp mod">
+        <pc:chgData name="Silvia Wen" userId="fa3c34b288dc686c" providerId="LiveId" clId="{B2C551B1-8328-47D2-B0E2-7614C02D7124}" dt="2023-02-09T15:29:28.477" v="13" actId="1076"/>
+        <pc:sldMkLst>
+          <pc:docMk/>
+          <pc:sldMk cId="0" sldId="291"/>
+        </pc:sldMkLst>
+        <pc:spChg chg="add del mod">
+          <ac:chgData name="Silvia Wen" userId="fa3c34b288dc686c" providerId="LiveId" clId="{B2C551B1-8328-47D2-B0E2-7614C02D7124}" dt="2023-02-09T15:29:23.988" v="12" actId="478"/>
+          <ac:spMkLst>
+            <pc:docMk/>
+            <pc:sldMk cId="0" sldId="291"/>
+            <ac:spMk id="7" creationId="{6DFA13E2-A3EA-57AC-38D1-BD8B6027F5B4}"/>
+          </ac:spMkLst>
+        </pc:spChg>
+        <pc:picChg chg="add mod">
+          <ac:chgData name="Silvia Wen" userId="fa3c34b288dc686c" providerId="LiveId" clId="{B2C551B1-8328-47D2-B0E2-7614C02D7124}" dt="2023-02-09T15:29:28.477" v="13" actId="1076"/>
+          <ac:picMkLst>
+            <pc:docMk/>
+            <pc:sldMk cId="0" sldId="291"/>
+            <ac:picMk id="3" creationId="{E7994DB7-5D5B-9020-0450-2CF9256CBB99}"/>
+          </ac:picMkLst>
+        </pc:picChg>
+        <pc:picChg chg="del mod">
+          <ac:chgData name="Silvia Wen" userId="fa3c34b288dc686c" providerId="LiveId" clId="{B2C551B1-8328-47D2-B0E2-7614C02D7124}" dt="2023-02-09T15:29:22.029" v="11" actId="478"/>
+          <ac:picMkLst>
+            <pc:docMk/>
+            <pc:sldMk cId="0" sldId="291"/>
+            <ac:picMk id="6" creationId="{36222083-9675-1777-F9ED-89997080D102}"/>
+          </ac:picMkLst>
+        </pc:picChg>
       </pc:sldChg>
     </pc:docChg>
   </pc:docChgLst>
@@ -3064,22 +3096,20 @@
       </p:sp>
       <p:pic>
         <p:nvPicPr>
-          <p:cNvPr id="6" name="Content Placeholder 5">
+          <p:cNvPr id="3" name="Grafik 2">
             <a:extLst>
               <a:ext uri="{FF2B5EF4-FFF2-40B4-BE49-F238E27FC236}">
-                <a16:creationId xmlns:a16="http://schemas.microsoft.com/office/drawing/2014/main" id="{36222083-9675-1777-F9ED-89997080D102}"/>
+                <a16:creationId xmlns:a16="http://schemas.microsoft.com/office/drawing/2014/main" id="{E7994DB7-5D5B-9020-0450-2CF9256CBB99}"/>
               </a:ext>
             </a:extLst>
           </p:cNvPr>
           <p:cNvPicPr>
-            <a:picLocks noGrp="1" noChangeAspect="1"/>
+            <a:picLocks noChangeAspect="1"/>
           </p:cNvPicPr>
-          <p:nvPr>
-            <p:ph idx="1"/>
-          </p:nvPr>
+          <p:nvPr/>
         </p:nvPicPr>
         <p:blipFill>
-          <a:blip r:embed="rId2" cstate="print">
+          <a:blip r:embed="rId2">
             <a:extLst>
               <a:ext uri="{28A0092B-C50C-407E-A947-70E740481C1C}">
                 <a14:useLocalDpi xmlns:a14="http://schemas.microsoft.com/office/drawing/2010/main" val="0"/>
@@ -3092,9 +3122,12 @@
         </p:blipFill>
         <p:spPr>
           <a:xfrm>
-            <a:off x="2271688" y="1129308"/>
-            <a:ext cx="5190006" cy="4248472"/>
+            <a:off x="2324488" y="1129308"/>
+            <a:ext cx="5190006" cy="4246040"/>
           </a:xfrm>
+          <a:prstGeom prst="rect">
+            <a:avLst/>
+          </a:prstGeom>
         </p:spPr>
       </p:pic>
     </p:spTree>

</xml_diff>